<commit_message>
Remove total N from schematic
</commit_message>
<xml_diff>
--- a/results/figures/5_days_PEG_exp_schematic.pptx
+++ b/results/figures/5_days_PEG_exp_schematic.pptx
@@ -2,7 +2,7 @@
 <file path=ppt/presentation.xml><?xml version="1.0" encoding="utf-8"?>
 <p:presentation xmlns:a="http://schemas.openxmlformats.org/drawingml/2006/main" xmlns:r="http://schemas.openxmlformats.org/officeDocument/2006/relationships" xmlns:p="http://schemas.openxmlformats.org/presentationml/2006/main" saveSubsetFonts="1">
   <p:sldMasterIdLst>
-    <p:sldMasterId id="2147483756" r:id="rId1"/>
+    <p:sldMasterId id="2147483792" r:id="rId1"/>
   </p:sldMasterIdLst>
   <p:notesMasterIdLst>
     <p:notesMasterId r:id="rId3"/>
@@ -10,7 +10,7 @@
   <p:sldIdLst>
     <p:sldId id="530" r:id="rId2"/>
   </p:sldIdLst>
-  <p:sldSz cx="8869363" cy="3200400"/>
+  <p:sldSz cx="8869363" cy="2925763"/>
   <p:notesSz cx="6858000" cy="9144000"/>
   <p:defaultTextStyle>
     <a:defPPr>
@@ -197,7 +197,7 @@
           <a:p>
             <a:fld id="{77734EDB-3B6B-CA48-BB41-C96E8374FD30}" type="datetimeFigureOut">
               <a:rPr lang="en-US" smtClean="0"/>
-              <a:t>2/16/21</a:t>
+              <a:t>2/17/21</a:t>
             </a:fld>
             <a:endParaRPr lang="en-US"/>
           </a:p>
@@ -215,8 +215,8 @@
         </p:nvSpPr>
         <p:spPr>
           <a:xfrm>
-            <a:off x="-847725" y="1143000"/>
-            <a:ext cx="8553450" cy="3086100"/>
+            <a:off x="-1247775" y="1143000"/>
+            <a:ext cx="9353550" cy="3086100"/>
           </a:xfrm>
           <a:prstGeom prst="rect">
             <a:avLst/>
@@ -493,8 +493,8 @@
         </p:nvSpPr>
         <p:spPr>
           <a:xfrm>
-            <a:off x="-846138" y="1143000"/>
-            <a:ext cx="8550276" cy="3086100"/>
+            <a:off x="-1247775" y="1143000"/>
+            <a:ext cx="9353550" cy="3086100"/>
           </a:xfrm>
           <a:custGeom>
             <a:avLst/>
@@ -778,15 +778,15 @@
         </p:nvSpPr>
         <p:spPr>
           <a:xfrm>
-            <a:off x="1108671" y="523772"/>
-            <a:ext cx="6652022" cy="1114213"/>
+            <a:off x="1108671" y="478823"/>
+            <a:ext cx="6652022" cy="1018599"/>
           </a:xfrm>
         </p:spPr>
         <p:txBody>
           <a:bodyPr anchor="b"/>
           <a:lstStyle>
             <a:lvl1pPr algn="ctr">
-              <a:defRPr sz="2800"/>
+              <a:defRPr sz="2560"/>
             </a:lvl1pPr>
           </a:lstStyle>
           <a:p>
@@ -810,8 +810,8 @@
         </p:nvSpPr>
         <p:spPr>
           <a:xfrm>
-            <a:off x="1108671" y="1680951"/>
-            <a:ext cx="6652022" cy="772689"/>
+            <a:off x="1108671" y="1536703"/>
+            <a:ext cx="6652022" cy="706382"/>
           </a:xfrm>
         </p:spPr>
         <p:txBody>
@@ -819,39 +819,39 @@
           <a:lstStyle>
             <a:lvl1pPr marL="0" indent="0" algn="ctr">
               <a:buNone/>
-              <a:defRPr sz="1120"/>
+              <a:defRPr sz="1024"/>
             </a:lvl1pPr>
-            <a:lvl2pPr marL="213375" indent="0" algn="ctr">
+            <a:lvl2pPr marL="195042" indent="0" algn="ctr">
               <a:buNone/>
-              <a:defRPr sz="933"/>
+              <a:defRPr sz="853"/>
             </a:lvl2pPr>
-            <a:lvl3pPr marL="426750" indent="0" algn="ctr">
+            <a:lvl3pPr marL="390083" indent="0" algn="ctr">
               <a:buNone/>
-              <a:defRPr sz="840"/>
+              <a:defRPr sz="768"/>
             </a:lvl3pPr>
-            <a:lvl4pPr marL="640126" indent="0" algn="ctr">
+            <a:lvl4pPr marL="585125" indent="0" algn="ctr">
               <a:buNone/>
-              <a:defRPr sz="747"/>
+              <a:defRPr sz="683"/>
             </a:lvl4pPr>
-            <a:lvl5pPr marL="853501" indent="0" algn="ctr">
+            <a:lvl5pPr marL="780166" indent="0" algn="ctr">
               <a:buNone/>
-              <a:defRPr sz="747"/>
+              <a:defRPr sz="683"/>
             </a:lvl5pPr>
-            <a:lvl6pPr marL="1066876" indent="0" algn="ctr">
+            <a:lvl6pPr marL="975208" indent="0" algn="ctr">
               <a:buNone/>
-              <a:defRPr sz="747"/>
+              <a:defRPr sz="683"/>
             </a:lvl6pPr>
-            <a:lvl7pPr marL="1280251" indent="0" algn="ctr">
+            <a:lvl7pPr marL="1170249" indent="0" algn="ctr">
               <a:buNone/>
-              <a:defRPr sz="747"/>
+              <a:defRPr sz="683"/>
             </a:lvl7pPr>
-            <a:lvl8pPr marL="1493627" indent="0" algn="ctr">
+            <a:lvl8pPr marL="1365291" indent="0" algn="ctr">
               <a:buNone/>
-              <a:defRPr sz="747"/>
+              <a:defRPr sz="683"/>
             </a:lvl8pPr>
-            <a:lvl9pPr marL="1707002" indent="0" algn="ctr">
+            <a:lvl9pPr marL="1560332" indent="0" algn="ctr">
               <a:buNone/>
-              <a:defRPr sz="747"/>
+              <a:defRPr sz="683"/>
             </a:lvl9pPr>
           </a:lstStyle>
           <a:p>
@@ -880,7 +880,7 @@
           <a:p>
             <a:fld id="{30AF97BF-8750-4713-9C5B-3A2A8059BBA3}" type="datetimeFigureOut">
               <a:rPr lang="en-US" smtClean="0"/>
-              <a:t>2/16/21</a:t>
+              <a:t>2/17/21</a:t>
             </a:fld>
             <a:endParaRPr lang="en-US"/>
           </a:p>
@@ -931,7 +931,7 @@
     </p:spTree>
     <p:extLst>
       <p:ext uri="{BB962C8B-B14F-4D97-AF65-F5344CB8AC3E}">
-        <p14:creationId xmlns:p14="http://schemas.microsoft.com/office/powerpoint/2010/main" val="3814040038"/>
+        <p14:creationId xmlns:p14="http://schemas.microsoft.com/office/powerpoint/2010/main" val="3544338690"/>
       </p:ext>
     </p:extLst>
   </p:cSld>
@@ -1050,7 +1050,7 @@
           <a:p>
             <a:fld id="{30AF97BF-8750-4713-9C5B-3A2A8059BBA3}" type="datetimeFigureOut">
               <a:rPr lang="en-US" smtClean="0"/>
-              <a:t>2/16/21</a:t>
+              <a:t>2/17/21</a:t>
             </a:fld>
             <a:endParaRPr lang="en-US"/>
           </a:p>
@@ -1101,7 +1101,7 @@
     </p:spTree>
     <p:extLst>
       <p:ext uri="{BB962C8B-B14F-4D97-AF65-F5344CB8AC3E}">
-        <p14:creationId xmlns:p14="http://schemas.microsoft.com/office/powerpoint/2010/main" val="4008450858"/>
+        <p14:creationId xmlns:p14="http://schemas.microsoft.com/office/powerpoint/2010/main" val="734521366"/>
       </p:ext>
     </p:extLst>
   </p:cSld>
@@ -1140,8 +1140,8 @@
         </p:nvSpPr>
         <p:spPr>
           <a:xfrm>
-            <a:off x="6347138" y="170394"/>
-            <a:ext cx="1912456" cy="2712191"/>
+            <a:off x="6347138" y="155770"/>
+            <a:ext cx="1912456" cy="2479449"/>
           </a:xfrm>
         </p:spPr>
         <p:txBody>
@@ -1168,8 +1168,8 @@
         </p:nvSpPr>
         <p:spPr>
           <a:xfrm>
-            <a:off x="609770" y="170394"/>
-            <a:ext cx="5626502" cy="2712191"/>
+            <a:off x="609769" y="155770"/>
+            <a:ext cx="5626502" cy="2479449"/>
           </a:xfrm>
         </p:spPr>
         <p:txBody>
@@ -1230,7 +1230,7 @@
           <a:p>
             <a:fld id="{30AF97BF-8750-4713-9C5B-3A2A8059BBA3}" type="datetimeFigureOut">
               <a:rPr lang="en-US" smtClean="0"/>
-              <a:t>2/16/21</a:t>
+              <a:t>2/17/21</a:t>
             </a:fld>
             <a:endParaRPr lang="en-US"/>
           </a:p>
@@ -1281,7 +1281,7 @@
     </p:spTree>
     <p:extLst>
       <p:ext uri="{BB962C8B-B14F-4D97-AF65-F5344CB8AC3E}">
-        <p14:creationId xmlns:p14="http://schemas.microsoft.com/office/powerpoint/2010/main" val="468522892"/>
+        <p14:creationId xmlns:p14="http://schemas.microsoft.com/office/powerpoint/2010/main" val="2366972687"/>
       </p:ext>
     </p:extLst>
   </p:cSld>
@@ -1400,7 +1400,7 @@
           <a:p>
             <a:fld id="{30AF97BF-8750-4713-9C5B-3A2A8059BBA3}" type="datetimeFigureOut">
               <a:rPr lang="en-US" smtClean="0"/>
-              <a:t>2/16/21</a:t>
+              <a:t>2/17/21</a:t>
             </a:fld>
             <a:endParaRPr lang="en-US"/>
           </a:p>
@@ -1451,7 +1451,7 @@
     </p:spTree>
     <p:extLst>
       <p:ext uri="{BB962C8B-B14F-4D97-AF65-F5344CB8AC3E}">
-        <p14:creationId xmlns:p14="http://schemas.microsoft.com/office/powerpoint/2010/main" val="3873868429"/>
+        <p14:creationId xmlns:p14="http://schemas.microsoft.com/office/powerpoint/2010/main" val="3025679065"/>
       </p:ext>
     </p:extLst>
   </p:cSld>
@@ -1490,15 +1490,15 @@
         </p:nvSpPr>
         <p:spPr>
           <a:xfrm>
-            <a:off x="605149" y="797880"/>
-            <a:ext cx="7649826" cy="1331277"/>
+            <a:off x="605149" y="729409"/>
+            <a:ext cx="7649826" cy="1217036"/>
           </a:xfrm>
         </p:spPr>
         <p:txBody>
           <a:bodyPr anchor="b"/>
           <a:lstStyle>
             <a:lvl1pPr>
-              <a:defRPr sz="2800"/>
+              <a:defRPr sz="2560"/>
             </a:lvl1pPr>
           </a:lstStyle>
           <a:p>
@@ -1522,8 +1522,8 @@
         </p:nvSpPr>
         <p:spPr>
           <a:xfrm>
-            <a:off x="605149" y="2141752"/>
-            <a:ext cx="7649826" cy="700087"/>
+            <a:off x="605149" y="1957959"/>
+            <a:ext cx="7649826" cy="640010"/>
           </a:xfrm>
         </p:spPr>
         <p:txBody>
@@ -1531,7 +1531,7 @@
           <a:lstStyle>
             <a:lvl1pPr marL="0" indent="0">
               <a:buNone/>
-              <a:defRPr sz="1120">
+              <a:defRPr sz="1024">
                 <a:solidFill>
                   <a:schemeClr val="tx1">
                     <a:tint val="75000"/>
@@ -1539,9 +1539,9 @@
                 </a:solidFill>
               </a:defRPr>
             </a:lvl1pPr>
-            <a:lvl2pPr marL="213375" indent="0">
+            <a:lvl2pPr marL="195042" indent="0">
               <a:buNone/>
-              <a:defRPr sz="933">
+              <a:defRPr sz="853">
                 <a:solidFill>
                   <a:schemeClr val="tx1">
                     <a:tint val="75000"/>
@@ -1549,9 +1549,9 @@
                 </a:solidFill>
               </a:defRPr>
             </a:lvl2pPr>
-            <a:lvl3pPr marL="426750" indent="0">
+            <a:lvl3pPr marL="390083" indent="0">
               <a:buNone/>
-              <a:defRPr sz="840">
+              <a:defRPr sz="768">
                 <a:solidFill>
                   <a:schemeClr val="tx1">
                     <a:tint val="75000"/>
@@ -1559,9 +1559,9 @@
                 </a:solidFill>
               </a:defRPr>
             </a:lvl3pPr>
-            <a:lvl4pPr marL="640126" indent="0">
+            <a:lvl4pPr marL="585125" indent="0">
               <a:buNone/>
-              <a:defRPr sz="747">
+              <a:defRPr sz="683">
                 <a:solidFill>
                   <a:schemeClr val="tx1">
                     <a:tint val="75000"/>
@@ -1569,9 +1569,9 @@
                 </a:solidFill>
               </a:defRPr>
             </a:lvl4pPr>
-            <a:lvl5pPr marL="853501" indent="0">
+            <a:lvl5pPr marL="780166" indent="0">
               <a:buNone/>
-              <a:defRPr sz="747">
+              <a:defRPr sz="683">
                 <a:solidFill>
                   <a:schemeClr val="tx1">
                     <a:tint val="75000"/>
@@ -1579,9 +1579,9 @@
                 </a:solidFill>
               </a:defRPr>
             </a:lvl5pPr>
-            <a:lvl6pPr marL="1066876" indent="0">
+            <a:lvl6pPr marL="975208" indent="0">
               <a:buNone/>
-              <a:defRPr sz="747">
+              <a:defRPr sz="683">
                 <a:solidFill>
                   <a:schemeClr val="tx1">
                     <a:tint val="75000"/>
@@ -1589,9 +1589,9 @@
                 </a:solidFill>
               </a:defRPr>
             </a:lvl6pPr>
-            <a:lvl7pPr marL="1280251" indent="0">
+            <a:lvl7pPr marL="1170249" indent="0">
               <a:buNone/>
-              <a:defRPr sz="747">
+              <a:defRPr sz="683">
                 <a:solidFill>
                   <a:schemeClr val="tx1">
                     <a:tint val="75000"/>
@@ -1599,9 +1599,9 @@
                 </a:solidFill>
               </a:defRPr>
             </a:lvl7pPr>
-            <a:lvl8pPr marL="1493627" indent="0">
+            <a:lvl8pPr marL="1365291" indent="0">
               <a:buNone/>
-              <a:defRPr sz="747">
+              <a:defRPr sz="683">
                 <a:solidFill>
                   <a:schemeClr val="tx1">
                     <a:tint val="75000"/>
@@ -1609,9 +1609,9 @@
                 </a:solidFill>
               </a:defRPr>
             </a:lvl8pPr>
-            <a:lvl9pPr marL="1707002" indent="0">
+            <a:lvl9pPr marL="1560332" indent="0">
               <a:buNone/>
-              <a:defRPr sz="747">
+              <a:defRPr sz="683">
                 <a:solidFill>
                   <a:schemeClr val="tx1">
                     <a:tint val="75000"/>
@@ -1646,7 +1646,7 @@
           <a:p>
             <a:fld id="{30AF97BF-8750-4713-9C5B-3A2A8059BBA3}" type="datetimeFigureOut">
               <a:rPr lang="en-US" smtClean="0"/>
-              <a:t>2/16/21</a:t>
+              <a:t>2/17/21</a:t>
             </a:fld>
             <a:endParaRPr lang="en-US"/>
           </a:p>
@@ -1697,7 +1697,7 @@
     </p:spTree>
     <p:extLst>
       <p:ext uri="{BB962C8B-B14F-4D97-AF65-F5344CB8AC3E}">
-        <p14:creationId xmlns:p14="http://schemas.microsoft.com/office/powerpoint/2010/main" val="3381015425"/>
+        <p14:creationId xmlns:p14="http://schemas.microsoft.com/office/powerpoint/2010/main" val="137150144"/>
       </p:ext>
     </p:extLst>
   </p:cSld>
@@ -1759,8 +1759,8 @@
         </p:nvSpPr>
         <p:spPr>
           <a:xfrm>
-            <a:off x="609769" y="851959"/>
-            <a:ext cx="3769479" cy="2030624"/>
+            <a:off x="609769" y="778849"/>
+            <a:ext cx="3769479" cy="1856370"/>
           </a:xfrm>
         </p:spPr>
         <p:txBody>
@@ -1816,8 +1816,8 @@
         </p:nvSpPr>
         <p:spPr>
           <a:xfrm>
-            <a:off x="4490116" y="851959"/>
-            <a:ext cx="3769479" cy="2030624"/>
+            <a:off x="4490115" y="778849"/>
+            <a:ext cx="3769479" cy="1856370"/>
           </a:xfrm>
         </p:spPr>
         <p:txBody>
@@ -1878,7 +1878,7 @@
           <a:p>
             <a:fld id="{30AF97BF-8750-4713-9C5B-3A2A8059BBA3}" type="datetimeFigureOut">
               <a:rPr lang="en-US" smtClean="0"/>
-              <a:t>2/16/21</a:t>
+              <a:t>2/17/21</a:t>
             </a:fld>
             <a:endParaRPr lang="en-US"/>
           </a:p>
@@ -1929,7 +1929,7 @@
     </p:spTree>
     <p:extLst>
       <p:ext uri="{BB962C8B-B14F-4D97-AF65-F5344CB8AC3E}">
-        <p14:creationId xmlns:p14="http://schemas.microsoft.com/office/powerpoint/2010/main" val="158159537"/>
+        <p14:creationId xmlns:p14="http://schemas.microsoft.com/office/powerpoint/2010/main" val="1476660013"/>
       </p:ext>
     </p:extLst>
   </p:cSld>
@@ -1968,8 +1968,8 @@
         </p:nvSpPr>
         <p:spPr>
           <a:xfrm>
-            <a:off x="610924" y="170392"/>
-            <a:ext cx="7649826" cy="618596"/>
+            <a:off x="610924" y="155770"/>
+            <a:ext cx="7649826" cy="565512"/>
           </a:xfrm>
         </p:spPr>
         <p:txBody>
@@ -1996,8 +1996,8 @@
         </p:nvSpPr>
         <p:spPr>
           <a:xfrm>
-            <a:off x="610924" y="784543"/>
-            <a:ext cx="3752156" cy="384492"/>
+            <a:off x="610924" y="717218"/>
+            <a:ext cx="3752156" cy="351498"/>
           </a:xfrm>
         </p:spPr>
         <p:txBody>
@@ -2005,39 +2005,39 @@
           <a:lstStyle>
             <a:lvl1pPr marL="0" indent="0">
               <a:buNone/>
-              <a:defRPr sz="1120" b="1"/>
+              <a:defRPr sz="1024" b="1"/>
             </a:lvl1pPr>
-            <a:lvl2pPr marL="213375" indent="0">
+            <a:lvl2pPr marL="195042" indent="0">
               <a:buNone/>
-              <a:defRPr sz="933" b="1"/>
+              <a:defRPr sz="853" b="1"/>
             </a:lvl2pPr>
-            <a:lvl3pPr marL="426750" indent="0">
+            <a:lvl3pPr marL="390083" indent="0">
               <a:buNone/>
-              <a:defRPr sz="840" b="1"/>
+              <a:defRPr sz="768" b="1"/>
             </a:lvl3pPr>
-            <a:lvl4pPr marL="640126" indent="0">
+            <a:lvl4pPr marL="585125" indent="0">
               <a:buNone/>
-              <a:defRPr sz="747" b="1"/>
+              <a:defRPr sz="683" b="1"/>
             </a:lvl4pPr>
-            <a:lvl5pPr marL="853501" indent="0">
+            <a:lvl5pPr marL="780166" indent="0">
               <a:buNone/>
-              <a:defRPr sz="747" b="1"/>
+              <a:defRPr sz="683" b="1"/>
             </a:lvl5pPr>
-            <a:lvl6pPr marL="1066876" indent="0">
+            <a:lvl6pPr marL="975208" indent="0">
               <a:buNone/>
-              <a:defRPr sz="747" b="1"/>
+              <a:defRPr sz="683" b="1"/>
             </a:lvl6pPr>
-            <a:lvl7pPr marL="1280251" indent="0">
+            <a:lvl7pPr marL="1170249" indent="0">
               <a:buNone/>
-              <a:defRPr sz="747" b="1"/>
+              <a:defRPr sz="683" b="1"/>
             </a:lvl7pPr>
-            <a:lvl8pPr marL="1493627" indent="0">
+            <a:lvl8pPr marL="1365291" indent="0">
               <a:buNone/>
-              <a:defRPr sz="747" b="1"/>
+              <a:defRPr sz="683" b="1"/>
             </a:lvl8pPr>
-            <a:lvl9pPr marL="1707002" indent="0">
+            <a:lvl9pPr marL="1560332" indent="0">
               <a:buNone/>
-              <a:defRPr sz="747" b="1"/>
+              <a:defRPr sz="683" b="1"/>
             </a:lvl9pPr>
           </a:lstStyle>
           <a:p>
@@ -2061,8 +2061,8 @@
         </p:nvSpPr>
         <p:spPr>
           <a:xfrm>
-            <a:off x="610924" y="1169035"/>
-            <a:ext cx="3752156" cy="1719474"/>
+            <a:off x="610924" y="1068716"/>
+            <a:ext cx="3752156" cy="1571921"/>
           </a:xfrm>
         </p:spPr>
         <p:txBody>
@@ -2118,8 +2118,8 @@
         </p:nvSpPr>
         <p:spPr>
           <a:xfrm>
-            <a:off x="4490116" y="784543"/>
-            <a:ext cx="3770635" cy="384492"/>
+            <a:off x="4490115" y="717218"/>
+            <a:ext cx="3770635" cy="351498"/>
           </a:xfrm>
         </p:spPr>
         <p:txBody>
@@ -2127,39 +2127,39 @@
           <a:lstStyle>
             <a:lvl1pPr marL="0" indent="0">
               <a:buNone/>
-              <a:defRPr sz="1120" b="1"/>
+              <a:defRPr sz="1024" b="1"/>
             </a:lvl1pPr>
-            <a:lvl2pPr marL="213375" indent="0">
+            <a:lvl2pPr marL="195042" indent="0">
               <a:buNone/>
-              <a:defRPr sz="933" b="1"/>
+              <a:defRPr sz="853" b="1"/>
             </a:lvl2pPr>
-            <a:lvl3pPr marL="426750" indent="0">
+            <a:lvl3pPr marL="390083" indent="0">
               <a:buNone/>
-              <a:defRPr sz="840" b="1"/>
+              <a:defRPr sz="768" b="1"/>
             </a:lvl3pPr>
-            <a:lvl4pPr marL="640126" indent="0">
+            <a:lvl4pPr marL="585125" indent="0">
               <a:buNone/>
-              <a:defRPr sz="747" b="1"/>
+              <a:defRPr sz="683" b="1"/>
             </a:lvl4pPr>
-            <a:lvl5pPr marL="853501" indent="0">
+            <a:lvl5pPr marL="780166" indent="0">
               <a:buNone/>
-              <a:defRPr sz="747" b="1"/>
+              <a:defRPr sz="683" b="1"/>
             </a:lvl5pPr>
-            <a:lvl6pPr marL="1066876" indent="0">
+            <a:lvl6pPr marL="975208" indent="0">
               <a:buNone/>
-              <a:defRPr sz="747" b="1"/>
+              <a:defRPr sz="683" b="1"/>
             </a:lvl6pPr>
-            <a:lvl7pPr marL="1280251" indent="0">
+            <a:lvl7pPr marL="1170249" indent="0">
               <a:buNone/>
-              <a:defRPr sz="747" b="1"/>
+              <a:defRPr sz="683" b="1"/>
             </a:lvl7pPr>
-            <a:lvl8pPr marL="1493627" indent="0">
+            <a:lvl8pPr marL="1365291" indent="0">
               <a:buNone/>
-              <a:defRPr sz="747" b="1"/>
+              <a:defRPr sz="683" b="1"/>
             </a:lvl8pPr>
-            <a:lvl9pPr marL="1707002" indent="0">
+            <a:lvl9pPr marL="1560332" indent="0">
               <a:buNone/>
-              <a:defRPr sz="747" b="1"/>
+              <a:defRPr sz="683" b="1"/>
             </a:lvl9pPr>
           </a:lstStyle>
           <a:p>
@@ -2183,8 +2183,8 @@
         </p:nvSpPr>
         <p:spPr>
           <a:xfrm>
-            <a:off x="4490116" y="1169035"/>
-            <a:ext cx="3770635" cy="1719474"/>
+            <a:off x="4490115" y="1068716"/>
+            <a:ext cx="3770635" cy="1571921"/>
           </a:xfrm>
         </p:spPr>
         <p:txBody>
@@ -2245,7 +2245,7 @@
           <a:p>
             <a:fld id="{30AF97BF-8750-4713-9C5B-3A2A8059BBA3}" type="datetimeFigureOut">
               <a:rPr lang="en-US" smtClean="0"/>
-              <a:t>2/16/21</a:t>
+              <a:t>2/17/21</a:t>
             </a:fld>
             <a:endParaRPr lang="en-US"/>
           </a:p>
@@ -2296,7 +2296,7 @@
     </p:spTree>
     <p:extLst>
       <p:ext uri="{BB962C8B-B14F-4D97-AF65-F5344CB8AC3E}">
-        <p14:creationId xmlns:p14="http://schemas.microsoft.com/office/powerpoint/2010/main" val="3618416737"/>
+        <p14:creationId xmlns:p14="http://schemas.microsoft.com/office/powerpoint/2010/main" val="3398856337"/>
       </p:ext>
     </p:extLst>
   </p:cSld>
@@ -2363,7 +2363,7 @@
           <a:p>
             <a:fld id="{30AF97BF-8750-4713-9C5B-3A2A8059BBA3}" type="datetimeFigureOut">
               <a:rPr lang="en-US" smtClean="0"/>
-              <a:t>2/16/21</a:t>
+              <a:t>2/17/21</a:t>
             </a:fld>
             <a:endParaRPr lang="en-US"/>
           </a:p>
@@ -2414,7 +2414,7 @@
     </p:spTree>
     <p:extLst>
       <p:ext uri="{BB962C8B-B14F-4D97-AF65-F5344CB8AC3E}">
-        <p14:creationId xmlns:p14="http://schemas.microsoft.com/office/powerpoint/2010/main" val="3723192671"/>
+        <p14:creationId xmlns:p14="http://schemas.microsoft.com/office/powerpoint/2010/main" val="951693027"/>
       </p:ext>
     </p:extLst>
   </p:cSld>
@@ -2458,7 +2458,7 @@
           <a:p>
             <a:fld id="{30AF97BF-8750-4713-9C5B-3A2A8059BBA3}" type="datetimeFigureOut">
               <a:rPr lang="en-US" smtClean="0"/>
-              <a:t>2/16/21</a:t>
+              <a:t>2/17/21</a:t>
             </a:fld>
             <a:endParaRPr lang="en-US"/>
           </a:p>
@@ -2509,7 +2509,7 @@
     </p:spTree>
     <p:extLst>
       <p:ext uri="{BB962C8B-B14F-4D97-AF65-F5344CB8AC3E}">
-        <p14:creationId xmlns:p14="http://schemas.microsoft.com/office/powerpoint/2010/main" val="265119258"/>
+        <p14:creationId xmlns:p14="http://schemas.microsoft.com/office/powerpoint/2010/main" val="3919141213"/>
       </p:ext>
     </p:extLst>
   </p:cSld>
@@ -2548,15 +2548,15 @@
         </p:nvSpPr>
         <p:spPr>
           <a:xfrm>
-            <a:off x="610924" y="213360"/>
-            <a:ext cx="2860600" cy="746760"/>
+            <a:off x="610924" y="195051"/>
+            <a:ext cx="2860600" cy="682678"/>
           </a:xfrm>
         </p:spPr>
         <p:txBody>
           <a:bodyPr anchor="b"/>
           <a:lstStyle>
             <a:lvl1pPr>
-              <a:defRPr sz="1493"/>
+              <a:defRPr sz="1365"/>
             </a:lvl1pPr>
           </a:lstStyle>
           <a:p>
@@ -2580,39 +2580,39 @@
         </p:nvSpPr>
         <p:spPr>
           <a:xfrm>
-            <a:off x="3770636" y="460799"/>
-            <a:ext cx="4490115" cy="2274358"/>
+            <a:off x="3770635" y="421256"/>
+            <a:ext cx="4490115" cy="2079188"/>
           </a:xfrm>
         </p:spPr>
         <p:txBody>
           <a:bodyPr/>
           <a:lstStyle>
             <a:lvl1pPr>
-              <a:defRPr sz="1493"/>
+              <a:defRPr sz="1365"/>
             </a:lvl1pPr>
             <a:lvl2pPr>
-              <a:defRPr sz="1307"/>
+              <a:defRPr sz="1194"/>
             </a:lvl2pPr>
             <a:lvl3pPr>
-              <a:defRPr sz="1120"/>
+              <a:defRPr sz="1024"/>
             </a:lvl3pPr>
             <a:lvl4pPr>
-              <a:defRPr sz="933"/>
+              <a:defRPr sz="853"/>
             </a:lvl4pPr>
             <a:lvl5pPr>
-              <a:defRPr sz="933"/>
+              <a:defRPr sz="853"/>
             </a:lvl5pPr>
             <a:lvl6pPr>
-              <a:defRPr sz="933"/>
+              <a:defRPr sz="853"/>
             </a:lvl6pPr>
             <a:lvl7pPr>
-              <a:defRPr sz="933"/>
+              <a:defRPr sz="853"/>
             </a:lvl7pPr>
             <a:lvl8pPr>
-              <a:defRPr sz="933"/>
+              <a:defRPr sz="853"/>
             </a:lvl8pPr>
             <a:lvl9pPr>
-              <a:defRPr sz="933"/>
+              <a:defRPr sz="853"/>
             </a:lvl9pPr>
           </a:lstStyle>
           <a:p>
@@ -2665,8 +2665,8 @@
         </p:nvSpPr>
         <p:spPr>
           <a:xfrm>
-            <a:off x="610924" y="960122"/>
-            <a:ext cx="2860600" cy="1778741"/>
+            <a:off x="610924" y="877729"/>
+            <a:ext cx="2860600" cy="1626101"/>
           </a:xfrm>
         </p:spPr>
         <p:txBody>
@@ -2674,39 +2674,39 @@
           <a:lstStyle>
             <a:lvl1pPr marL="0" indent="0">
               <a:buNone/>
-              <a:defRPr sz="747"/>
+              <a:defRPr sz="683"/>
             </a:lvl1pPr>
-            <a:lvl2pPr marL="213375" indent="0">
+            <a:lvl2pPr marL="195042" indent="0">
               <a:buNone/>
-              <a:defRPr sz="653"/>
+              <a:defRPr sz="597"/>
             </a:lvl2pPr>
-            <a:lvl3pPr marL="426750" indent="0">
+            <a:lvl3pPr marL="390083" indent="0">
               <a:buNone/>
-              <a:defRPr sz="560"/>
+              <a:defRPr sz="512"/>
             </a:lvl3pPr>
-            <a:lvl4pPr marL="640126" indent="0">
+            <a:lvl4pPr marL="585125" indent="0">
               <a:buNone/>
-              <a:defRPr sz="467"/>
+              <a:defRPr sz="427"/>
             </a:lvl4pPr>
-            <a:lvl5pPr marL="853501" indent="0">
+            <a:lvl5pPr marL="780166" indent="0">
               <a:buNone/>
-              <a:defRPr sz="467"/>
+              <a:defRPr sz="427"/>
             </a:lvl5pPr>
-            <a:lvl6pPr marL="1066876" indent="0">
+            <a:lvl6pPr marL="975208" indent="0">
               <a:buNone/>
-              <a:defRPr sz="467"/>
+              <a:defRPr sz="427"/>
             </a:lvl6pPr>
-            <a:lvl7pPr marL="1280251" indent="0">
+            <a:lvl7pPr marL="1170249" indent="0">
               <a:buNone/>
-              <a:defRPr sz="467"/>
+              <a:defRPr sz="427"/>
             </a:lvl7pPr>
-            <a:lvl8pPr marL="1493627" indent="0">
+            <a:lvl8pPr marL="1365291" indent="0">
               <a:buNone/>
-              <a:defRPr sz="467"/>
+              <a:defRPr sz="427"/>
             </a:lvl8pPr>
-            <a:lvl9pPr marL="1707002" indent="0">
+            <a:lvl9pPr marL="1560332" indent="0">
               <a:buNone/>
-              <a:defRPr sz="467"/>
+              <a:defRPr sz="427"/>
             </a:lvl9pPr>
           </a:lstStyle>
           <a:p>
@@ -2735,7 +2735,7 @@
           <a:p>
             <a:fld id="{30AF97BF-8750-4713-9C5B-3A2A8059BBA3}" type="datetimeFigureOut">
               <a:rPr lang="en-US" smtClean="0"/>
-              <a:t>2/16/21</a:t>
+              <a:t>2/17/21</a:t>
             </a:fld>
             <a:endParaRPr lang="en-US"/>
           </a:p>
@@ -2786,7 +2786,7 @@
     </p:spTree>
     <p:extLst>
       <p:ext uri="{BB962C8B-B14F-4D97-AF65-F5344CB8AC3E}">
-        <p14:creationId xmlns:p14="http://schemas.microsoft.com/office/powerpoint/2010/main" val="680636841"/>
+        <p14:creationId xmlns:p14="http://schemas.microsoft.com/office/powerpoint/2010/main" val="2520926027"/>
       </p:ext>
     </p:extLst>
   </p:cSld>
@@ -2825,15 +2825,15 @@
         </p:nvSpPr>
         <p:spPr>
           <a:xfrm>
-            <a:off x="610924" y="213360"/>
-            <a:ext cx="2860600" cy="746760"/>
+            <a:off x="610924" y="195051"/>
+            <a:ext cx="2860600" cy="682678"/>
           </a:xfrm>
         </p:spPr>
         <p:txBody>
           <a:bodyPr anchor="b"/>
           <a:lstStyle>
             <a:lvl1pPr>
-              <a:defRPr sz="1493"/>
+              <a:defRPr sz="1365"/>
             </a:lvl1pPr>
           </a:lstStyle>
           <a:p>
@@ -2857,8 +2857,8 @@
         </p:nvSpPr>
         <p:spPr>
           <a:xfrm>
-            <a:off x="3770636" y="460799"/>
-            <a:ext cx="4490115" cy="2274358"/>
+            <a:off x="3770635" y="421256"/>
+            <a:ext cx="4490115" cy="2079188"/>
           </a:xfrm>
         </p:spPr>
         <p:txBody>
@@ -2866,39 +2866,39 @@
           <a:lstStyle>
             <a:lvl1pPr marL="0" indent="0">
               <a:buNone/>
-              <a:defRPr sz="1493"/>
+              <a:defRPr sz="1365"/>
             </a:lvl1pPr>
-            <a:lvl2pPr marL="213375" indent="0">
+            <a:lvl2pPr marL="195042" indent="0">
               <a:buNone/>
-              <a:defRPr sz="1307"/>
+              <a:defRPr sz="1194"/>
             </a:lvl2pPr>
-            <a:lvl3pPr marL="426750" indent="0">
+            <a:lvl3pPr marL="390083" indent="0">
               <a:buNone/>
-              <a:defRPr sz="1120"/>
+              <a:defRPr sz="1024"/>
             </a:lvl3pPr>
-            <a:lvl4pPr marL="640126" indent="0">
+            <a:lvl4pPr marL="585125" indent="0">
               <a:buNone/>
-              <a:defRPr sz="933"/>
+              <a:defRPr sz="853"/>
             </a:lvl4pPr>
-            <a:lvl5pPr marL="853501" indent="0">
+            <a:lvl5pPr marL="780166" indent="0">
               <a:buNone/>
-              <a:defRPr sz="933"/>
+              <a:defRPr sz="853"/>
             </a:lvl5pPr>
-            <a:lvl6pPr marL="1066876" indent="0">
+            <a:lvl6pPr marL="975208" indent="0">
               <a:buNone/>
-              <a:defRPr sz="933"/>
+              <a:defRPr sz="853"/>
             </a:lvl6pPr>
-            <a:lvl7pPr marL="1280251" indent="0">
+            <a:lvl7pPr marL="1170249" indent="0">
               <a:buNone/>
-              <a:defRPr sz="933"/>
+              <a:defRPr sz="853"/>
             </a:lvl7pPr>
-            <a:lvl8pPr marL="1493627" indent="0">
+            <a:lvl8pPr marL="1365291" indent="0">
               <a:buNone/>
-              <a:defRPr sz="933"/>
+              <a:defRPr sz="853"/>
             </a:lvl8pPr>
-            <a:lvl9pPr marL="1707002" indent="0">
+            <a:lvl9pPr marL="1560332" indent="0">
               <a:buNone/>
-              <a:defRPr sz="933"/>
+              <a:defRPr sz="853"/>
             </a:lvl9pPr>
           </a:lstStyle>
           <a:p>
@@ -2922,8 +2922,8 @@
         </p:nvSpPr>
         <p:spPr>
           <a:xfrm>
-            <a:off x="610924" y="960122"/>
-            <a:ext cx="2860600" cy="1778741"/>
+            <a:off x="610924" y="877729"/>
+            <a:ext cx="2860600" cy="1626101"/>
           </a:xfrm>
         </p:spPr>
         <p:txBody>
@@ -2931,39 +2931,39 @@
           <a:lstStyle>
             <a:lvl1pPr marL="0" indent="0">
               <a:buNone/>
-              <a:defRPr sz="747"/>
+              <a:defRPr sz="683"/>
             </a:lvl1pPr>
-            <a:lvl2pPr marL="213375" indent="0">
+            <a:lvl2pPr marL="195042" indent="0">
               <a:buNone/>
-              <a:defRPr sz="653"/>
+              <a:defRPr sz="597"/>
             </a:lvl2pPr>
-            <a:lvl3pPr marL="426750" indent="0">
+            <a:lvl3pPr marL="390083" indent="0">
               <a:buNone/>
-              <a:defRPr sz="560"/>
+              <a:defRPr sz="512"/>
             </a:lvl3pPr>
-            <a:lvl4pPr marL="640126" indent="0">
+            <a:lvl4pPr marL="585125" indent="0">
               <a:buNone/>
-              <a:defRPr sz="467"/>
+              <a:defRPr sz="427"/>
             </a:lvl4pPr>
-            <a:lvl5pPr marL="853501" indent="0">
+            <a:lvl5pPr marL="780166" indent="0">
               <a:buNone/>
-              <a:defRPr sz="467"/>
+              <a:defRPr sz="427"/>
             </a:lvl5pPr>
-            <a:lvl6pPr marL="1066876" indent="0">
+            <a:lvl6pPr marL="975208" indent="0">
               <a:buNone/>
-              <a:defRPr sz="467"/>
+              <a:defRPr sz="427"/>
             </a:lvl6pPr>
-            <a:lvl7pPr marL="1280251" indent="0">
+            <a:lvl7pPr marL="1170249" indent="0">
               <a:buNone/>
-              <a:defRPr sz="467"/>
+              <a:defRPr sz="427"/>
             </a:lvl7pPr>
-            <a:lvl8pPr marL="1493627" indent="0">
+            <a:lvl8pPr marL="1365291" indent="0">
               <a:buNone/>
-              <a:defRPr sz="467"/>
+              <a:defRPr sz="427"/>
             </a:lvl8pPr>
-            <a:lvl9pPr marL="1707002" indent="0">
+            <a:lvl9pPr marL="1560332" indent="0">
               <a:buNone/>
-              <a:defRPr sz="467"/>
+              <a:defRPr sz="427"/>
             </a:lvl9pPr>
           </a:lstStyle>
           <a:p>
@@ -2992,7 +2992,7 @@
           <a:p>
             <a:fld id="{30AF97BF-8750-4713-9C5B-3A2A8059BBA3}" type="datetimeFigureOut">
               <a:rPr lang="en-US" smtClean="0"/>
-              <a:t>2/16/21</a:t>
+              <a:t>2/17/21</a:t>
             </a:fld>
             <a:endParaRPr lang="en-US"/>
           </a:p>
@@ -3043,7 +3043,7 @@
     </p:spTree>
     <p:extLst>
       <p:ext uri="{BB962C8B-B14F-4D97-AF65-F5344CB8AC3E}">
-        <p14:creationId xmlns:p14="http://schemas.microsoft.com/office/powerpoint/2010/main" val="3164779674"/>
+        <p14:creationId xmlns:p14="http://schemas.microsoft.com/office/powerpoint/2010/main" val="1480549906"/>
       </p:ext>
     </p:extLst>
   </p:cSld>
@@ -3087,8 +3087,8 @@
         </p:nvSpPr>
         <p:spPr>
           <a:xfrm>
-            <a:off x="609769" y="170392"/>
-            <a:ext cx="7649826" cy="618596"/>
+            <a:off x="609769" y="155770"/>
+            <a:ext cx="7649826" cy="565512"/>
           </a:xfrm>
           <a:prstGeom prst="rect">
             <a:avLst/>
@@ -3120,8 +3120,8 @@
         </p:nvSpPr>
         <p:spPr>
           <a:xfrm>
-            <a:off x="609769" y="851959"/>
-            <a:ext cx="7649826" cy="2030624"/>
+            <a:off x="609769" y="778849"/>
+            <a:ext cx="7649826" cy="1856370"/>
           </a:xfrm>
           <a:prstGeom prst="rect">
             <a:avLst/>
@@ -3182,8 +3182,8 @@
         </p:nvSpPr>
         <p:spPr>
           <a:xfrm>
-            <a:off x="609770" y="2966297"/>
-            <a:ext cx="1995607" cy="170392"/>
+            <a:off x="609769" y="2711749"/>
+            <a:ext cx="1995607" cy="155770"/>
           </a:xfrm>
           <a:prstGeom prst="rect">
             <a:avLst/>
@@ -3193,7 +3193,7 @@
           <a:bodyPr vert="horz" lIns="91440" tIns="45720" rIns="91440" bIns="45720" rtlCol="0" anchor="ctr"/>
           <a:lstStyle>
             <a:lvl1pPr algn="l">
-              <a:defRPr sz="560">
+              <a:defRPr sz="512">
                 <a:solidFill>
                   <a:schemeClr val="tx1">
                     <a:tint val="75000"/>
@@ -3205,7 +3205,7 @@
           <a:p>
             <a:fld id="{30AF97BF-8750-4713-9C5B-3A2A8059BBA3}" type="datetimeFigureOut">
               <a:rPr lang="en-US" smtClean="0"/>
-              <a:t>2/16/21</a:t>
+              <a:t>2/17/21</a:t>
             </a:fld>
             <a:endParaRPr lang="en-US"/>
           </a:p>
@@ -3223,8 +3223,8 @@
         </p:nvSpPr>
         <p:spPr>
           <a:xfrm>
-            <a:off x="2937977" y="2966297"/>
-            <a:ext cx="2993410" cy="170392"/>
+            <a:off x="2937977" y="2711749"/>
+            <a:ext cx="2993410" cy="155770"/>
           </a:xfrm>
           <a:prstGeom prst="rect">
             <a:avLst/>
@@ -3234,7 +3234,7 @@
           <a:bodyPr vert="horz" lIns="91440" tIns="45720" rIns="91440" bIns="45720" rtlCol="0" anchor="ctr"/>
           <a:lstStyle>
             <a:lvl1pPr algn="ctr">
-              <a:defRPr sz="560">
+              <a:defRPr sz="512">
                 <a:solidFill>
                   <a:schemeClr val="tx1">
                     <a:tint val="75000"/>
@@ -3260,8 +3260,8 @@
         </p:nvSpPr>
         <p:spPr>
           <a:xfrm>
-            <a:off x="6263988" y="2966297"/>
-            <a:ext cx="1995607" cy="170392"/>
+            <a:off x="6263987" y="2711749"/>
+            <a:ext cx="1995607" cy="155770"/>
           </a:xfrm>
           <a:prstGeom prst="rect">
             <a:avLst/>
@@ -3271,7 +3271,7 @@
           <a:bodyPr vert="horz" lIns="91440" tIns="45720" rIns="91440" bIns="45720" rtlCol="0" anchor="ctr"/>
           <a:lstStyle>
             <a:lvl1pPr algn="r">
-              <a:defRPr sz="560">
+              <a:defRPr sz="512">
                 <a:solidFill>
                   <a:schemeClr val="tx1">
                     <a:tint val="75000"/>
@@ -3292,27 +3292,27 @@
     </p:spTree>
     <p:extLst>
       <p:ext uri="{BB962C8B-B14F-4D97-AF65-F5344CB8AC3E}">
-        <p14:creationId xmlns:p14="http://schemas.microsoft.com/office/powerpoint/2010/main" val="1652053885"/>
+        <p14:creationId xmlns:p14="http://schemas.microsoft.com/office/powerpoint/2010/main" val="674202127"/>
       </p:ext>
     </p:extLst>
   </p:cSld>
   <p:clrMap bg1="lt1" tx1="dk1" bg2="lt2" tx2="dk2" accent1="accent1" accent2="accent2" accent3="accent3" accent4="accent4" accent5="accent5" accent6="accent6" hlink="hlink" folHlink="folHlink"/>
   <p:sldLayoutIdLst>
-    <p:sldLayoutId id="2147483757" r:id="rId1"/>
-    <p:sldLayoutId id="2147483758" r:id="rId2"/>
-    <p:sldLayoutId id="2147483759" r:id="rId3"/>
-    <p:sldLayoutId id="2147483760" r:id="rId4"/>
-    <p:sldLayoutId id="2147483761" r:id="rId5"/>
-    <p:sldLayoutId id="2147483762" r:id="rId6"/>
-    <p:sldLayoutId id="2147483763" r:id="rId7"/>
-    <p:sldLayoutId id="2147483764" r:id="rId8"/>
-    <p:sldLayoutId id="2147483765" r:id="rId9"/>
-    <p:sldLayoutId id="2147483766" r:id="rId10"/>
-    <p:sldLayoutId id="2147483767" r:id="rId11"/>
+    <p:sldLayoutId id="2147483793" r:id="rId1"/>
+    <p:sldLayoutId id="2147483794" r:id="rId2"/>
+    <p:sldLayoutId id="2147483795" r:id="rId3"/>
+    <p:sldLayoutId id="2147483796" r:id="rId4"/>
+    <p:sldLayoutId id="2147483797" r:id="rId5"/>
+    <p:sldLayoutId id="2147483798" r:id="rId6"/>
+    <p:sldLayoutId id="2147483799" r:id="rId7"/>
+    <p:sldLayoutId id="2147483800" r:id="rId8"/>
+    <p:sldLayoutId id="2147483801" r:id="rId9"/>
+    <p:sldLayoutId id="2147483802" r:id="rId10"/>
+    <p:sldLayoutId id="2147483803" r:id="rId11"/>
   </p:sldLayoutIdLst>
   <p:txStyles>
     <p:titleStyle>
-      <a:lvl1pPr algn="l" defTabSz="426750" rtl="0" eaLnBrk="1" latinLnBrk="0" hangingPunct="1">
+      <a:lvl1pPr algn="l" defTabSz="390083" rtl="0" eaLnBrk="1" latinLnBrk="0" hangingPunct="1">
         <a:lnSpc>
           <a:spcPct val="90000"/>
         </a:lnSpc>
@@ -3320,7 +3320,7 @@
           <a:spcPct val="0"/>
         </a:spcBef>
         <a:buNone/>
-        <a:defRPr sz="2053" kern="1200">
+        <a:defRPr sz="1877" kern="1200">
           <a:solidFill>
             <a:schemeClr val="tx1"/>
           </a:solidFill>
@@ -3331,16 +3331,16 @@
       </a:lvl1pPr>
     </p:titleStyle>
     <p:bodyStyle>
-      <a:lvl1pPr marL="106688" indent="-106688" algn="l" defTabSz="426750" rtl="0" eaLnBrk="1" latinLnBrk="0" hangingPunct="1">
+      <a:lvl1pPr marL="97521" indent="-97521" algn="l" defTabSz="390083" rtl="0" eaLnBrk="1" latinLnBrk="0" hangingPunct="1">
         <a:lnSpc>
           <a:spcPct val="90000"/>
         </a:lnSpc>
         <a:spcBef>
-          <a:spcPts val="467"/>
+          <a:spcPts val="427"/>
         </a:spcBef>
         <a:buFont typeface="Arial" panose="020B0604020202020204" pitchFamily="34" charset="0"/>
         <a:buChar char="•"/>
-        <a:defRPr sz="1307" kern="1200">
+        <a:defRPr sz="1194" kern="1200">
           <a:solidFill>
             <a:schemeClr val="tx1"/>
           </a:solidFill>
@@ -3349,16 +3349,16 @@
           <a:cs typeface="+mn-cs"/>
         </a:defRPr>
       </a:lvl1pPr>
-      <a:lvl2pPr marL="320063" indent="-106688" algn="l" defTabSz="426750" rtl="0" eaLnBrk="1" latinLnBrk="0" hangingPunct="1">
+      <a:lvl2pPr marL="292562" indent="-97521" algn="l" defTabSz="390083" rtl="0" eaLnBrk="1" latinLnBrk="0" hangingPunct="1">
         <a:lnSpc>
           <a:spcPct val="90000"/>
         </a:lnSpc>
         <a:spcBef>
-          <a:spcPts val="233"/>
+          <a:spcPts val="213"/>
         </a:spcBef>
         <a:buFont typeface="Arial" panose="020B0604020202020204" pitchFamily="34" charset="0"/>
         <a:buChar char="•"/>
-        <a:defRPr sz="1120" kern="1200">
+        <a:defRPr sz="1024" kern="1200">
           <a:solidFill>
             <a:schemeClr val="tx1"/>
           </a:solidFill>
@@ -3367,16 +3367,16 @@
           <a:cs typeface="+mn-cs"/>
         </a:defRPr>
       </a:lvl2pPr>
-      <a:lvl3pPr marL="533438" indent="-106688" algn="l" defTabSz="426750" rtl="0" eaLnBrk="1" latinLnBrk="0" hangingPunct="1">
+      <a:lvl3pPr marL="487604" indent="-97521" algn="l" defTabSz="390083" rtl="0" eaLnBrk="1" latinLnBrk="0" hangingPunct="1">
         <a:lnSpc>
           <a:spcPct val="90000"/>
         </a:lnSpc>
         <a:spcBef>
-          <a:spcPts val="233"/>
+          <a:spcPts val="213"/>
         </a:spcBef>
         <a:buFont typeface="Arial" panose="020B0604020202020204" pitchFamily="34" charset="0"/>
         <a:buChar char="•"/>
-        <a:defRPr sz="933" kern="1200">
+        <a:defRPr sz="853" kern="1200">
           <a:solidFill>
             <a:schemeClr val="tx1"/>
           </a:solidFill>
@@ -3385,16 +3385,16 @@
           <a:cs typeface="+mn-cs"/>
         </a:defRPr>
       </a:lvl3pPr>
-      <a:lvl4pPr marL="746813" indent="-106688" algn="l" defTabSz="426750" rtl="0" eaLnBrk="1" latinLnBrk="0" hangingPunct="1">
+      <a:lvl4pPr marL="682645" indent="-97521" algn="l" defTabSz="390083" rtl="0" eaLnBrk="1" latinLnBrk="0" hangingPunct="1">
         <a:lnSpc>
           <a:spcPct val="90000"/>
         </a:lnSpc>
         <a:spcBef>
-          <a:spcPts val="233"/>
+          <a:spcPts val="213"/>
         </a:spcBef>
         <a:buFont typeface="Arial" panose="020B0604020202020204" pitchFamily="34" charset="0"/>
         <a:buChar char="•"/>
-        <a:defRPr sz="840" kern="1200">
+        <a:defRPr sz="768" kern="1200">
           <a:solidFill>
             <a:schemeClr val="tx1"/>
           </a:solidFill>
@@ -3403,16 +3403,16 @@
           <a:cs typeface="+mn-cs"/>
         </a:defRPr>
       </a:lvl4pPr>
-      <a:lvl5pPr marL="960189" indent="-106688" algn="l" defTabSz="426750" rtl="0" eaLnBrk="1" latinLnBrk="0" hangingPunct="1">
+      <a:lvl5pPr marL="877687" indent="-97521" algn="l" defTabSz="390083" rtl="0" eaLnBrk="1" latinLnBrk="0" hangingPunct="1">
         <a:lnSpc>
           <a:spcPct val="90000"/>
         </a:lnSpc>
         <a:spcBef>
-          <a:spcPts val="233"/>
+          <a:spcPts val="213"/>
         </a:spcBef>
         <a:buFont typeface="Arial" panose="020B0604020202020204" pitchFamily="34" charset="0"/>
         <a:buChar char="•"/>
-        <a:defRPr sz="840" kern="1200">
+        <a:defRPr sz="768" kern="1200">
           <a:solidFill>
             <a:schemeClr val="tx1"/>
           </a:solidFill>
@@ -3421,16 +3421,16 @@
           <a:cs typeface="+mn-cs"/>
         </a:defRPr>
       </a:lvl5pPr>
-      <a:lvl6pPr marL="1173564" indent="-106688" algn="l" defTabSz="426750" rtl="0" eaLnBrk="1" latinLnBrk="0" hangingPunct="1">
+      <a:lvl6pPr marL="1072728" indent="-97521" algn="l" defTabSz="390083" rtl="0" eaLnBrk="1" latinLnBrk="0" hangingPunct="1">
         <a:lnSpc>
           <a:spcPct val="90000"/>
         </a:lnSpc>
         <a:spcBef>
-          <a:spcPts val="233"/>
+          <a:spcPts val="213"/>
         </a:spcBef>
         <a:buFont typeface="Arial" panose="020B0604020202020204" pitchFamily="34" charset="0"/>
         <a:buChar char="•"/>
-        <a:defRPr sz="840" kern="1200">
+        <a:defRPr sz="768" kern="1200">
           <a:solidFill>
             <a:schemeClr val="tx1"/>
           </a:solidFill>
@@ -3439,16 +3439,16 @@
           <a:cs typeface="+mn-cs"/>
         </a:defRPr>
       </a:lvl6pPr>
-      <a:lvl7pPr marL="1386939" indent="-106688" algn="l" defTabSz="426750" rtl="0" eaLnBrk="1" latinLnBrk="0" hangingPunct="1">
+      <a:lvl7pPr marL="1267770" indent="-97521" algn="l" defTabSz="390083" rtl="0" eaLnBrk="1" latinLnBrk="0" hangingPunct="1">
         <a:lnSpc>
           <a:spcPct val="90000"/>
         </a:lnSpc>
         <a:spcBef>
-          <a:spcPts val="233"/>
+          <a:spcPts val="213"/>
         </a:spcBef>
         <a:buFont typeface="Arial" panose="020B0604020202020204" pitchFamily="34" charset="0"/>
         <a:buChar char="•"/>
-        <a:defRPr sz="840" kern="1200">
+        <a:defRPr sz="768" kern="1200">
           <a:solidFill>
             <a:schemeClr val="tx1"/>
           </a:solidFill>
@@ -3457,16 +3457,16 @@
           <a:cs typeface="+mn-cs"/>
         </a:defRPr>
       </a:lvl7pPr>
-      <a:lvl8pPr marL="1600314" indent="-106688" algn="l" defTabSz="426750" rtl="0" eaLnBrk="1" latinLnBrk="0" hangingPunct="1">
+      <a:lvl8pPr marL="1462811" indent="-97521" algn="l" defTabSz="390083" rtl="0" eaLnBrk="1" latinLnBrk="0" hangingPunct="1">
         <a:lnSpc>
           <a:spcPct val="90000"/>
         </a:lnSpc>
         <a:spcBef>
-          <a:spcPts val="233"/>
+          <a:spcPts val="213"/>
         </a:spcBef>
         <a:buFont typeface="Arial" panose="020B0604020202020204" pitchFamily="34" charset="0"/>
         <a:buChar char="•"/>
-        <a:defRPr sz="840" kern="1200">
+        <a:defRPr sz="768" kern="1200">
           <a:solidFill>
             <a:schemeClr val="tx1"/>
           </a:solidFill>
@@ -3475,16 +3475,16 @@
           <a:cs typeface="+mn-cs"/>
         </a:defRPr>
       </a:lvl8pPr>
-      <a:lvl9pPr marL="1813690" indent="-106688" algn="l" defTabSz="426750" rtl="0" eaLnBrk="1" latinLnBrk="0" hangingPunct="1">
+      <a:lvl9pPr marL="1657853" indent="-97521" algn="l" defTabSz="390083" rtl="0" eaLnBrk="1" latinLnBrk="0" hangingPunct="1">
         <a:lnSpc>
           <a:spcPct val="90000"/>
         </a:lnSpc>
         <a:spcBef>
-          <a:spcPts val="233"/>
+          <a:spcPts val="213"/>
         </a:spcBef>
         <a:buFont typeface="Arial" panose="020B0604020202020204" pitchFamily="34" charset="0"/>
         <a:buChar char="•"/>
-        <a:defRPr sz="840" kern="1200">
+        <a:defRPr sz="768" kern="1200">
           <a:solidFill>
             <a:schemeClr val="tx1"/>
           </a:solidFill>
@@ -3498,8 +3498,8 @@
       <a:defPPr>
         <a:defRPr lang="en-US"/>
       </a:defPPr>
-      <a:lvl1pPr marL="0" algn="l" defTabSz="426750" rtl="0" eaLnBrk="1" latinLnBrk="0" hangingPunct="1">
-        <a:defRPr sz="840" kern="1200">
+      <a:lvl1pPr marL="0" algn="l" defTabSz="390083" rtl="0" eaLnBrk="1" latinLnBrk="0" hangingPunct="1">
+        <a:defRPr sz="768" kern="1200">
           <a:solidFill>
             <a:schemeClr val="tx1"/>
           </a:solidFill>
@@ -3508,8 +3508,8 @@
           <a:cs typeface="+mn-cs"/>
         </a:defRPr>
       </a:lvl1pPr>
-      <a:lvl2pPr marL="213375" algn="l" defTabSz="426750" rtl="0" eaLnBrk="1" latinLnBrk="0" hangingPunct="1">
-        <a:defRPr sz="840" kern="1200">
+      <a:lvl2pPr marL="195042" algn="l" defTabSz="390083" rtl="0" eaLnBrk="1" latinLnBrk="0" hangingPunct="1">
+        <a:defRPr sz="768" kern="1200">
           <a:solidFill>
             <a:schemeClr val="tx1"/>
           </a:solidFill>
@@ -3518,8 +3518,8 @@
           <a:cs typeface="+mn-cs"/>
         </a:defRPr>
       </a:lvl2pPr>
-      <a:lvl3pPr marL="426750" algn="l" defTabSz="426750" rtl="0" eaLnBrk="1" latinLnBrk="0" hangingPunct="1">
-        <a:defRPr sz="840" kern="1200">
+      <a:lvl3pPr marL="390083" algn="l" defTabSz="390083" rtl="0" eaLnBrk="1" latinLnBrk="0" hangingPunct="1">
+        <a:defRPr sz="768" kern="1200">
           <a:solidFill>
             <a:schemeClr val="tx1"/>
           </a:solidFill>
@@ -3528,8 +3528,8 @@
           <a:cs typeface="+mn-cs"/>
         </a:defRPr>
       </a:lvl3pPr>
-      <a:lvl4pPr marL="640126" algn="l" defTabSz="426750" rtl="0" eaLnBrk="1" latinLnBrk="0" hangingPunct="1">
-        <a:defRPr sz="840" kern="1200">
+      <a:lvl4pPr marL="585125" algn="l" defTabSz="390083" rtl="0" eaLnBrk="1" latinLnBrk="0" hangingPunct="1">
+        <a:defRPr sz="768" kern="1200">
           <a:solidFill>
             <a:schemeClr val="tx1"/>
           </a:solidFill>
@@ -3538,8 +3538,8 @@
           <a:cs typeface="+mn-cs"/>
         </a:defRPr>
       </a:lvl4pPr>
-      <a:lvl5pPr marL="853501" algn="l" defTabSz="426750" rtl="0" eaLnBrk="1" latinLnBrk="0" hangingPunct="1">
-        <a:defRPr sz="840" kern="1200">
+      <a:lvl5pPr marL="780166" algn="l" defTabSz="390083" rtl="0" eaLnBrk="1" latinLnBrk="0" hangingPunct="1">
+        <a:defRPr sz="768" kern="1200">
           <a:solidFill>
             <a:schemeClr val="tx1"/>
           </a:solidFill>
@@ -3548,8 +3548,8 @@
           <a:cs typeface="+mn-cs"/>
         </a:defRPr>
       </a:lvl5pPr>
-      <a:lvl6pPr marL="1066876" algn="l" defTabSz="426750" rtl="0" eaLnBrk="1" latinLnBrk="0" hangingPunct="1">
-        <a:defRPr sz="840" kern="1200">
+      <a:lvl6pPr marL="975208" algn="l" defTabSz="390083" rtl="0" eaLnBrk="1" latinLnBrk="0" hangingPunct="1">
+        <a:defRPr sz="768" kern="1200">
           <a:solidFill>
             <a:schemeClr val="tx1"/>
           </a:solidFill>
@@ -3558,8 +3558,8 @@
           <a:cs typeface="+mn-cs"/>
         </a:defRPr>
       </a:lvl6pPr>
-      <a:lvl7pPr marL="1280251" algn="l" defTabSz="426750" rtl="0" eaLnBrk="1" latinLnBrk="0" hangingPunct="1">
-        <a:defRPr sz="840" kern="1200">
+      <a:lvl7pPr marL="1170249" algn="l" defTabSz="390083" rtl="0" eaLnBrk="1" latinLnBrk="0" hangingPunct="1">
+        <a:defRPr sz="768" kern="1200">
           <a:solidFill>
             <a:schemeClr val="tx1"/>
           </a:solidFill>
@@ -3568,8 +3568,8 @@
           <a:cs typeface="+mn-cs"/>
         </a:defRPr>
       </a:lvl7pPr>
-      <a:lvl8pPr marL="1493627" algn="l" defTabSz="426750" rtl="0" eaLnBrk="1" latinLnBrk="0" hangingPunct="1">
-        <a:defRPr sz="840" kern="1200">
+      <a:lvl8pPr marL="1365291" algn="l" defTabSz="390083" rtl="0" eaLnBrk="1" latinLnBrk="0" hangingPunct="1">
+        <a:defRPr sz="768" kern="1200">
           <a:solidFill>
             <a:schemeClr val="tx1"/>
           </a:solidFill>
@@ -3578,8 +3578,8 @@
           <a:cs typeface="+mn-cs"/>
         </a:defRPr>
       </a:lvl8pPr>
-      <a:lvl9pPr marL="1707002" algn="l" defTabSz="426750" rtl="0" eaLnBrk="1" latinLnBrk="0" hangingPunct="1">
-        <a:defRPr sz="840" kern="1200">
+      <a:lvl9pPr marL="1560332" algn="l" defTabSz="390083" rtl="0" eaLnBrk="1" latinLnBrk="0" hangingPunct="1">
+        <a:defRPr sz="768" kern="1200">
           <a:solidFill>
             <a:schemeClr val="tx1"/>
           </a:solidFill>
@@ -3618,7 +3618,7 @@
         </p:nvSpPr>
         <p:spPr>
           <a:xfrm>
-            <a:off x="-79413" y="1670183"/>
+            <a:off x="-79412" y="1675269"/>
             <a:ext cx="11497745" cy="1938800"/>
           </a:xfrm>
           <a:prstGeom prst="rect">
@@ -3720,7 +3720,7 @@
             </a:r>
           </a:p>
           <a:p>
-            <a:pPr marL="342900" indent="-342900">
+            <a:pPr marL="342918" indent="-342918">
               <a:buFont typeface="Arial" panose="020B0604020202020204" pitchFamily="34" charset="0"/>
               <a:buChar char="•"/>
             </a:pPr>
@@ -3734,7 +3734,7 @@
             </a:endParaRPr>
           </a:p>
           <a:p>
-            <a:pPr marL="342900" indent="-342900">
+            <a:pPr marL="342918" indent="-342918">
               <a:buFont typeface="Arial" panose="020B0604020202020204" pitchFamily="34" charset="0"/>
               <a:buChar char="•"/>
             </a:pPr>
@@ -3774,7 +3774,7 @@
         </p:blipFill>
         <p:spPr>
           <a:xfrm>
-            <a:off x="52198" y="110804"/>
+            <a:off x="52199" y="115894"/>
             <a:ext cx="990600" cy="872159"/>
           </a:xfrm>
           <a:prstGeom prst="rect">
@@ -3794,7 +3794,7 @@
         </p:nvSpPr>
         <p:spPr>
           <a:xfrm>
-            <a:off x="238806" y="1301558"/>
+            <a:off x="238806" y="1306644"/>
             <a:ext cx="1066800" cy="461600"/>
           </a:xfrm>
           <a:prstGeom prst="rect">
@@ -3835,7 +3835,7 @@
         </p:nvSpPr>
         <p:spPr>
           <a:xfrm flipH="1">
-            <a:off x="8404462" y="462290"/>
+            <a:off x="8404462" y="467376"/>
             <a:ext cx="214200" cy="262456"/>
           </a:xfrm>
           <a:prstGeom prst="downArrow">
@@ -3864,7 +3864,7 @@
           <a:lstStyle/>
           <a:p>
             <a:pPr algn="ctr"/>
-            <a:endParaRPr sz="1867">
+            <a:endParaRPr sz="1868">
               <a:latin typeface="Calibri"/>
               <a:ea typeface="Calibri"/>
               <a:cs typeface="Calibri"/>
@@ -3881,7 +3881,7 @@
         </p:nvSpPr>
         <p:spPr>
           <a:xfrm>
-            <a:off x="5436849" y="2151542"/>
+            <a:off x="5436849" y="2156628"/>
             <a:ext cx="1676400" cy="523200"/>
           </a:xfrm>
           <a:prstGeom prst="rect">
@@ -3956,8 +3956,8 @@
         </p:nvSpPr>
         <p:spPr>
           <a:xfrm>
-            <a:off x="7145683" y="138090"/>
-            <a:ext cx="2637200" cy="338800"/>
+            <a:off x="7145687" y="143176"/>
+            <a:ext cx="2637199" cy="338800"/>
           </a:xfrm>
           <a:prstGeom prst="rect">
             <a:avLst/>
@@ -3992,55 +3992,13 @@
       </p:sp>
       <p:sp>
         <p:nvSpPr>
-          <p:cNvPr id="660" name="Google Shape;660;p64"/>
-          <p:cNvSpPr txBox="1"/>
-          <p:nvPr/>
-        </p:nvSpPr>
-        <p:spPr>
-          <a:xfrm>
-            <a:off x="2302844" y="2845755"/>
-            <a:ext cx="2678400" cy="461600"/>
-          </a:xfrm>
-          <a:prstGeom prst="rect">
-            <a:avLst/>
-          </a:prstGeom>
-          <a:noFill/>
-          <a:ln>
-            <a:noFill/>
-          </a:ln>
-        </p:spPr>
-        <p:txBody>
-          <a:bodyPr spcFirstLastPara="1" wrap="square" lIns="91433" tIns="45700" rIns="91433" bIns="45700" anchor="t" anchorCtr="0">
-            <a:noAutofit/>
-          </a:bodyPr>
-          <a:lstStyle/>
-          <a:p>
-            <a:pPr algn="ctr"/>
-            <a:r>
-              <a:rPr lang="en" sz="2000" dirty="0">
-                <a:solidFill>
-                  <a:schemeClr val="dk1"/>
-                </a:solidFill>
-                <a:latin typeface="Calibri"/>
-                <a:ea typeface="Calibri"/>
-                <a:cs typeface="Calibri"/>
-                <a:sym typeface="Calibri"/>
-              </a:rPr>
-              <a:t>Total N=62</a:t>
-            </a:r>
-            <a:endParaRPr sz="2000" dirty="0"/>
-          </a:p>
-        </p:txBody>
-      </p:sp>
-      <p:sp>
-        <p:nvSpPr>
           <p:cNvPr id="666" name="Google Shape;666;p64"/>
           <p:cNvSpPr txBox="1"/>
           <p:nvPr/>
         </p:nvSpPr>
         <p:spPr>
           <a:xfrm>
-            <a:off x="5087746" y="1338213"/>
+            <a:off x="5087747" y="1343299"/>
             <a:ext cx="434800" cy="400400"/>
           </a:xfrm>
           <a:prstGeom prst="rect">
@@ -4082,7 +4040,7 @@
         </p:nvSpPr>
         <p:spPr>
           <a:xfrm>
-            <a:off x="5555686" y="1338213"/>
+            <a:off x="5555687" y="1343299"/>
             <a:ext cx="434800" cy="400400"/>
           </a:xfrm>
           <a:prstGeom prst="rect">
@@ -4124,7 +4082,7 @@
         </p:nvSpPr>
         <p:spPr>
           <a:xfrm>
-            <a:off x="6443011" y="1338213"/>
+            <a:off x="6443015" y="1343299"/>
             <a:ext cx="604801" cy="400400"/>
           </a:xfrm>
           <a:prstGeom prst="rect">
@@ -4166,7 +4124,7 @@
         </p:nvSpPr>
         <p:spPr>
           <a:xfrm rot="10800000">
-            <a:off x="5669471" y="1663624"/>
+            <a:off x="5669475" y="1668711"/>
             <a:ext cx="186465" cy="523200"/>
           </a:xfrm>
           <a:prstGeom prst="downArrow">
@@ -4195,7 +4153,7 @@
           <a:lstStyle/>
           <a:p>
             <a:pPr algn="ctr"/>
-            <a:endParaRPr sz="1867">
+            <a:endParaRPr sz="1868">
               <a:latin typeface="Calibri"/>
               <a:ea typeface="Calibri"/>
               <a:cs typeface="Calibri"/>
@@ -4214,7 +4172,7 @@
         </p:nvCxnSpPr>
         <p:spPr>
           <a:xfrm flipV="1">
-            <a:off x="1135090" y="1122069"/>
+            <a:off x="1135094" y="1127159"/>
             <a:ext cx="7567327" cy="1293"/>
           </a:xfrm>
           <a:prstGeom prst="straightConnector1">
@@ -4253,7 +4211,7 @@
         </p:nvCxnSpPr>
         <p:spPr>
           <a:xfrm>
-            <a:off x="4184224" y="862725"/>
+            <a:off x="4184224" y="867811"/>
             <a:ext cx="0" cy="528002"/>
           </a:xfrm>
           <a:prstGeom prst="straightConnector1">
@@ -4279,7 +4237,7 @@
         </p:nvCxnSpPr>
         <p:spPr>
           <a:xfrm>
-            <a:off x="5347874" y="862725"/>
+            <a:off x="5347874" y="867811"/>
             <a:ext cx="0" cy="528002"/>
           </a:xfrm>
           <a:prstGeom prst="straightConnector1">
@@ -4305,7 +4263,7 @@
         </p:nvCxnSpPr>
         <p:spPr>
           <a:xfrm>
-            <a:off x="5766446" y="862725"/>
+            <a:off x="5766446" y="867811"/>
             <a:ext cx="0" cy="528002"/>
           </a:xfrm>
           <a:prstGeom prst="straightConnector1">
@@ -4331,7 +4289,7 @@
         </p:nvSpPr>
         <p:spPr>
           <a:xfrm>
-            <a:off x="6795448" y="1338213"/>
+            <a:off x="6795452" y="1343299"/>
             <a:ext cx="604801" cy="400400"/>
           </a:xfrm>
           <a:prstGeom prst="rect">
@@ -4379,7 +4337,7 @@
         </p:nvCxnSpPr>
         <p:spPr>
           <a:xfrm>
-            <a:off x="1135077" y="862725"/>
+            <a:off x="1135077" y="867811"/>
             <a:ext cx="0" cy="528002"/>
           </a:xfrm>
           <a:prstGeom prst="straightConnector1">
@@ -4411,7 +4369,7 @@
         </p:nvCxnSpPr>
         <p:spPr>
           <a:xfrm>
-            <a:off x="7105375" y="862725"/>
+            <a:off x="7105375" y="867811"/>
             <a:ext cx="0" cy="528002"/>
           </a:xfrm>
           <a:prstGeom prst="straightConnector1">
@@ -4443,7 +4401,7 @@
         </p:nvCxnSpPr>
         <p:spPr>
           <a:xfrm>
-            <a:off x="6745306" y="862725"/>
+            <a:off x="6745307" y="867811"/>
             <a:ext cx="0" cy="528002"/>
           </a:xfrm>
           <a:prstGeom prst="straightConnector1">
@@ -4475,7 +4433,7 @@
         </p:nvSpPr>
         <p:spPr>
           <a:xfrm>
-            <a:off x="2482523" y="1338213"/>
+            <a:off x="2482527" y="1343299"/>
             <a:ext cx="582599" cy="400400"/>
           </a:xfrm>
           <a:prstGeom prst="rect">
@@ -4523,7 +4481,7 @@
         </p:nvSpPr>
         <p:spPr>
           <a:xfrm>
-            <a:off x="3932639" y="1338213"/>
+            <a:off x="3932640" y="1343299"/>
             <a:ext cx="434800" cy="400400"/>
           </a:xfrm>
           <a:prstGeom prst="rect">
@@ -4571,7 +4529,7 @@
         </p:nvCxnSpPr>
         <p:spPr>
           <a:xfrm>
-            <a:off x="8322601" y="862725"/>
+            <a:off x="8322601" y="867811"/>
             <a:ext cx="0" cy="528002"/>
           </a:xfrm>
           <a:prstGeom prst="straightConnector1">
@@ -4603,7 +4561,7 @@
         </p:nvSpPr>
         <p:spPr>
           <a:xfrm>
-            <a:off x="8013874" y="1338213"/>
+            <a:off x="8013878" y="1343299"/>
             <a:ext cx="604801" cy="400400"/>
           </a:xfrm>
           <a:prstGeom prst="rect">
@@ -4653,7 +4611,7 @@
         </p:nvSpPr>
         <p:spPr>
           <a:xfrm>
-            <a:off x="8432949" y="1338213"/>
+            <a:off x="8432953" y="1343299"/>
             <a:ext cx="604801" cy="400400"/>
           </a:xfrm>
           <a:prstGeom prst="rect">
@@ -4700,7 +4658,7 @@
         </p:nvCxnSpPr>
         <p:spPr>
           <a:xfrm>
-            <a:off x="8702409" y="862725"/>
+            <a:off x="8702409" y="867811"/>
             <a:ext cx="0" cy="528002"/>
           </a:xfrm>
           <a:prstGeom prst="straightConnector1">
@@ -4732,7 +4690,7 @@
         </p:nvSpPr>
         <p:spPr>
           <a:xfrm>
-            <a:off x="4574946" y="1838367"/>
+            <a:off x="4574947" y="1843454"/>
             <a:ext cx="1460400" cy="523200"/>
           </a:xfrm>
           <a:prstGeom prst="rect">
@@ -4799,7 +4757,7 @@
         </p:nvGrpSpPr>
         <p:grpSpPr>
           <a:xfrm>
-            <a:off x="1120854" y="528518"/>
+            <a:off x="1120854" y="533604"/>
             <a:ext cx="5042380" cy="474050"/>
             <a:chOff x="5703840" y="1733513"/>
             <a:chExt cx="5042380" cy="474050"/>
@@ -4848,7 +4806,7 @@
             <a:lstStyle/>
             <a:p>
               <a:pPr algn="ctr"/>
-              <a:endParaRPr sz="1867" dirty="0">
+              <a:endParaRPr sz="1868" dirty="0">
                 <a:solidFill>
                   <a:schemeClr val="lt1"/>
                 </a:solidFill>
@@ -4920,7 +4878,7 @@
         </p:nvSpPr>
         <p:spPr>
           <a:xfrm flipH="1">
-            <a:off x="6806673" y="463976"/>
+            <a:off x="6806673" y="469062"/>
             <a:ext cx="214200" cy="262456"/>
           </a:xfrm>
           <a:prstGeom prst="downArrow">
@@ -4949,7 +4907,7 @@
           <a:lstStyle/>
           <a:p>
             <a:pPr algn="ctr"/>
-            <a:endParaRPr sz="1867">
+            <a:endParaRPr sz="1868">
               <a:latin typeface="Calibri"/>
               <a:ea typeface="Calibri"/>
               <a:cs typeface="Calibri"/>
@@ -4972,8 +4930,8 @@
         </p:nvSpPr>
         <p:spPr>
           <a:xfrm>
-            <a:off x="5580919" y="144965"/>
-            <a:ext cx="2637200" cy="338800"/>
+            <a:off x="5580923" y="150051"/>
+            <a:ext cx="2637199" cy="338800"/>
           </a:xfrm>
           <a:prstGeom prst="rect">
             <a:avLst/>
@@ -5020,8 +4978,8 @@
         </p:nvGrpSpPr>
         <p:grpSpPr>
           <a:xfrm>
-            <a:off x="4137279" y="432957"/>
-            <a:ext cx="4167256" cy="490016"/>
+            <a:off x="4137282" y="438043"/>
+            <a:ext cx="4167257" cy="490016"/>
             <a:chOff x="5833478" y="1888848"/>
             <a:chExt cx="4167256" cy="490016"/>
           </a:xfrm>
@@ -5069,7 +5027,7 @@
             <a:lstStyle/>
             <a:p>
               <a:pPr algn="ctr"/>
-              <a:endParaRPr sz="1867" dirty="0">
+              <a:endParaRPr sz="1868" dirty="0">
                 <a:solidFill>
                   <a:schemeClr val="lt1"/>
                 </a:solidFill>
@@ -5141,8 +5099,8 @@
         </p:nvGrpSpPr>
         <p:grpSpPr>
           <a:xfrm>
-            <a:off x="4125403" y="10324"/>
-            <a:ext cx="4167256" cy="478575"/>
+            <a:off x="4125406" y="15412"/>
+            <a:ext cx="4167257" cy="478575"/>
             <a:chOff x="5704199" y="2522728"/>
             <a:chExt cx="4167256" cy="478575"/>
           </a:xfrm>
@@ -5190,7 +5148,7 @@
             <a:lstStyle/>
             <a:p>
               <a:pPr algn="ctr"/>
-              <a:endParaRPr sz="1867" dirty="0">
+              <a:endParaRPr sz="1868" dirty="0">
                 <a:solidFill>
                   <a:schemeClr val="lt1"/>
                 </a:solidFill>
@@ -5262,7 +5220,7 @@
         </p:nvSpPr>
         <p:spPr>
           <a:xfrm rot="10800000" flipH="1">
-            <a:off x="5312474" y="1628511"/>
+            <a:off x="5312474" y="1633598"/>
             <a:ext cx="232030" cy="281318"/>
           </a:xfrm>
           <a:prstGeom prst="downArrow">
@@ -5291,7 +5249,7 @@
           <a:lstStyle/>
           <a:p>
             <a:pPr algn="ctr"/>
-            <a:endParaRPr sz="1867">
+            <a:endParaRPr sz="1868">
               <a:solidFill>
                 <a:schemeClr val="lt1"/>
               </a:solidFill>
@@ -5317,7 +5275,7 @@
         </p:nvCxnSpPr>
         <p:spPr>
           <a:xfrm>
-            <a:off x="2799818" y="862725"/>
+            <a:off x="2799818" y="867811"/>
             <a:ext cx="0" cy="528002"/>
           </a:xfrm>
           <a:prstGeom prst="straightConnector1">
@@ -5349,7 +5307,7 @@
         </p:nvSpPr>
         <p:spPr>
           <a:xfrm>
-            <a:off x="805036" y="1338213"/>
+            <a:off x="805040" y="1343299"/>
             <a:ext cx="582599" cy="400400"/>
           </a:xfrm>
           <a:prstGeom prst="rect">
@@ -5397,7 +5355,7 @@
         </p:nvSpPr>
         <p:spPr>
           <a:xfrm rot="10800000" flipH="1">
-            <a:off x="5097425" y="1622590"/>
+            <a:off x="5097425" y="1627677"/>
             <a:ext cx="232030" cy="281318"/>
           </a:xfrm>
           <a:prstGeom prst="downArrow">
@@ -5426,7 +5384,7 @@
           <a:lstStyle/>
           <a:p>
             <a:pPr algn="ctr"/>
-            <a:endParaRPr sz="1867">
+            <a:endParaRPr sz="1868">
               <a:solidFill>
                 <a:schemeClr val="lt1"/>
               </a:solidFill>
@@ -5949,68 +5907,15 @@
                                   </p:childTnLst>
                                 </p:cTn>
                               </p:par>
-                            </p:childTnLst>
-                          </p:cTn>
-                        </p:par>
-                      </p:childTnLst>
-                    </p:cTn>
-                  </p:par>
-                  <p:par>
-                    <p:cTn id="46" fill="hold">
-                      <p:stCondLst>
-                        <p:cond delay="indefinite"/>
-                      </p:stCondLst>
-                      <p:childTnLst>
-                        <p:par>
-                          <p:cTn id="47" fill="hold">
-                            <p:stCondLst>
-                              <p:cond delay="0"/>
-                            </p:stCondLst>
-                            <p:childTnLst>
                               <p:par>
-                                <p:cTn id="48" presetID="9" presetClass="entr" presetSubtype="0" fill="hold" grpId="0" nodeType="clickEffect">
+                                <p:cTn id="46" presetID="9" presetClass="entr" presetSubtype="0" fill="hold" grpId="0" nodeType="withEffect">
                                   <p:stCondLst>
                                     <p:cond delay="0"/>
                                   </p:stCondLst>
                                   <p:childTnLst>
                                     <p:set>
                                       <p:cBhvr>
-                                        <p:cTn id="49" dur="1" fill="hold">
-                                          <p:stCondLst>
-                                            <p:cond delay="0"/>
-                                          </p:stCondLst>
-                                        </p:cTn>
-                                        <p:tgtEl>
-                                          <p:spTgt spid="660"/>
-                                        </p:tgtEl>
-                                        <p:attrNameLst>
-                                          <p:attrName>style.visibility</p:attrName>
-                                        </p:attrNameLst>
-                                      </p:cBhvr>
-                                      <p:to>
-                                        <p:strVal val="visible"/>
-                                      </p:to>
-                                    </p:set>
-                                    <p:animEffect transition="in" filter="dissolve">
-                                      <p:cBhvr>
-                                        <p:cTn id="50" dur="500"/>
-                                        <p:tgtEl>
-                                          <p:spTgt spid="660"/>
-                                        </p:tgtEl>
-                                      </p:cBhvr>
-                                    </p:animEffect>
-                                  </p:childTnLst>
-                                </p:cTn>
-                              </p:par>
-                              <p:par>
-                                <p:cTn id="51" presetID="9" presetClass="entr" presetSubtype="0" fill="hold" grpId="0" nodeType="withEffect">
-                                  <p:stCondLst>
-                                    <p:cond delay="0"/>
-                                  </p:stCondLst>
-                                  <p:childTnLst>
-                                    <p:set>
-                                      <p:cBhvr>
-                                        <p:cTn id="52" dur="1" fill="hold">
+                                        <p:cTn id="47" dur="1" fill="hold">
                                           <p:stCondLst>
                                             <p:cond delay="0"/>
                                           </p:stCondLst>
@@ -6028,7 +5933,7 @@
                                     </p:set>
                                     <p:animEffect transition="in" filter="dissolve">
                                       <p:cBhvr>
-                                        <p:cTn id="53" dur="500"/>
+                                        <p:cTn id="48" dur="500"/>
                                         <p:tgtEl>
                                           <p:spTgt spid="81"/>
                                         </p:tgtEl>
@@ -6067,7 +5972,6 @@
     <p:bldLst>
       <p:bldP spid="655" grpId="0" animBg="1"/>
       <p:bldP spid="659" grpId="0"/>
-      <p:bldP spid="660" grpId="0"/>
       <p:bldP spid="85" grpId="0" animBg="1"/>
       <p:bldP spid="86" grpId="0"/>
       <p:bldP spid="108" grpId="0" animBg="1"/>

</xml_diff>

<commit_message>
Fix typo on schematic
</commit_message>
<xml_diff>
--- a/results/figures/5_days_PEG_exp_schematic.pptx
+++ b/results/figures/5_days_PEG_exp_schematic.pptx
@@ -197,7 +197,7 @@
           <a:p>
             <a:fld id="{77734EDB-3B6B-CA48-BB41-C96E8374FD30}" type="datetimeFigureOut">
               <a:rPr lang="en-US" smtClean="0"/>
-              <a:t>2/17/21</a:t>
+              <a:t>4/4/21</a:t>
             </a:fld>
             <a:endParaRPr lang="en-US"/>
           </a:p>
@@ -880,7 +880,7 @@
           <a:p>
             <a:fld id="{30AF97BF-8750-4713-9C5B-3A2A8059BBA3}" type="datetimeFigureOut">
               <a:rPr lang="en-US" smtClean="0"/>
-              <a:t>2/17/21</a:t>
+              <a:t>4/4/21</a:t>
             </a:fld>
             <a:endParaRPr lang="en-US"/>
           </a:p>
@@ -1050,7 +1050,7 @@
           <a:p>
             <a:fld id="{30AF97BF-8750-4713-9C5B-3A2A8059BBA3}" type="datetimeFigureOut">
               <a:rPr lang="en-US" smtClean="0"/>
-              <a:t>2/17/21</a:t>
+              <a:t>4/4/21</a:t>
             </a:fld>
             <a:endParaRPr lang="en-US"/>
           </a:p>
@@ -1230,7 +1230,7 @@
           <a:p>
             <a:fld id="{30AF97BF-8750-4713-9C5B-3A2A8059BBA3}" type="datetimeFigureOut">
               <a:rPr lang="en-US" smtClean="0"/>
-              <a:t>2/17/21</a:t>
+              <a:t>4/4/21</a:t>
             </a:fld>
             <a:endParaRPr lang="en-US"/>
           </a:p>
@@ -1400,7 +1400,7 @@
           <a:p>
             <a:fld id="{30AF97BF-8750-4713-9C5B-3A2A8059BBA3}" type="datetimeFigureOut">
               <a:rPr lang="en-US" smtClean="0"/>
-              <a:t>2/17/21</a:t>
+              <a:t>4/4/21</a:t>
             </a:fld>
             <a:endParaRPr lang="en-US"/>
           </a:p>
@@ -1646,7 +1646,7 @@
           <a:p>
             <a:fld id="{30AF97BF-8750-4713-9C5B-3A2A8059BBA3}" type="datetimeFigureOut">
               <a:rPr lang="en-US" smtClean="0"/>
-              <a:t>2/17/21</a:t>
+              <a:t>4/4/21</a:t>
             </a:fld>
             <a:endParaRPr lang="en-US"/>
           </a:p>
@@ -1878,7 +1878,7 @@
           <a:p>
             <a:fld id="{30AF97BF-8750-4713-9C5B-3A2A8059BBA3}" type="datetimeFigureOut">
               <a:rPr lang="en-US" smtClean="0"/>
-              <a:t>2/17/21</a:t>
+              <a:t>4/4/21</a:t>
             </a:fld>
             <a:endParaRPr lang="en-US"/>
           </a:p>
@@ -2245,7 +2245,7 @@
           <a:p>
             <a:fld id="{30AF97BF-8750-4713-9C5B-3A2A8059BBA3}" type="datetimeFigureOut">
               <a:rPr lang="en-US" smtClean="0"/>
-              <a:t>2/17/21</a:t>
+              <a:t>4/4/21</a:t>
             </a:fld>
             <a:endParaRPr lang="en-US"/>
           </a:p>
@@ -2363,7 +2363,7 @@
           <a:p>
             <a:fld id="{30AF97BF-8750-4713-9C5B-3A2A8059BBA3}" type="datetimeFigureOut">
               <a:rPr lang="en-US" smtClean="0"/>
-              <a:t>2/17/21</a:t>
+              <a:t>4/4/21</a:t>
             </a:fld>
             <a:endParaRPr lang="en-US"/>
           </a:p>
@@ -2458,7 +2458,7 @@
           <a:p>
             <a:fld id="{30AF97BF-8750-4713-9C5B-3A2A8059BBA3}" type="datetimeFigureOut">
               <a:rPr lang="en-US" smtClean="0"/>
-              <a:t>2/17/21</a:t>
+              <a:t>4/4/21</a:t>
             </a:fld>
             <a:endParaRPr lang="en-US"/>
           </a:p>
@@ -2735,7 +2735,7 @@
           <a:p>
             <a:fld id="{30AF97BF-8750-4713-9C5B-3A2A8059BBA3}" type="datetimeFigureOut">
               <a:rPr lang="en-US" smtClean="0"/>
-              <a:t>2/17/21</a:t>
+              <a:t>4/4/21</a:t>
             </a:fld>
             <a:endParaRPr lang="en-US"/>
           </a:p>
@@ -2992,7 +2992,7 @@
           <a:p>
             <a:fld id="{30AF97BF-8750-4713-9C5B-3A2A8059BBA3}" type="datetimeFigureOut">
               <a:rPr lang="en-US" smtClean="0"/>
-              <a:t>2/17/21</a:t>
+              <a:t>4/4/21</a:t>
             </a:fld>
             <a:endParaRPr lang="en-US"/>
           </a:p>
@@ -3205,7 +3205,7 @@
           <a:p>
             <a:fld id="{30AF97BF-8750-4713-9C5B-3A2A8059BBA3}" type="datetimeFigureOut">
               <a:rPr lang="en-US" smtClean="0"/>
-              <a:t>2/17/21</a:t>
+              <a:t>4/4/21</a:t>
             </a:fld>
             <a:endParaRPr lang="en-US"/>
           </a:p>
@@ -3657,7 +3657,7 @@
                 <a:cs typeface="Calibri"/>
                 <a:sym typeface="Calibri"/>
               </a:rPr>
-              <a:t>5-days of 15% PEG 3350 in drinking water (N-21)</a:t>
+              <a:t>5-days of 15% PEG 3350 in drinking water (N=21)</a:t>
             </a:r>
             <a:r>
               <a:rPr lang="en-US" sz="2000" dirty="0">
@@ -3703,7 +3703,7 @@
                 <a:cs typeface="Calibri"/>
                 <a:sym typeface="Calibri"/>
               </a:rPr>
-              <a:t>. (N = 9)</a:t>
+              <a:t>. (N=9)</a:t>
             </a:r>
           </a:p>
           <a:p>
@@ -3716,7 +3716,29 @@
                 <a:cs typeface="Calibri"/>
                 <a:sym typeface="Calibri"/>
               </a:rPr>
-              <a:t>5-day PEG 3350 + 10-day recovery (N = 12)</a:t>
+              <a:t>5-day PEG 3350 + 10-day recovery </a:t>
+            </a:r>
+            <a:r>
+              <a:rPr lang="en-US" sz="2000">
+                <a:solidFill>
+                  <a:srgbClr val="225EA8"/>
+                </a:solidFill>
+                <a:ea typeface="Calibri"/>
+                <a:cs typeface="Calibri"/>
+                <a:sym typeface="Calibri"/>
+              </a:rPr>
+              <a:t>(N=12</a:t>
+            </a:r>
+            <a:r>
+              <a:rPr lang="en-US" sz="2000" dirty="0">
+                <a:solidFill>
+                  <a:srgbClr val="225EA8"/>
+                </a:solidFill>
+                <a:ea typeface="Calibri"/>
+                <a:cs typeface="Calibri"/>
+                <a:sym typeface="Calibri"/>
+              </a:rPr>
+              <a:t>)</a:t>
             </a:r>
           </a:p>
           <a:p>

</xml_diff>

<commit_message>
Remove 3350 from description of groups
</commit_message>
<xml_diff>
--- a/results/figures/5_days_PEG_exp_schematic.pptx
+++ b/results/figures/5_days_PEG_exp_schematic.pptx
@@ -197,7 +197,7 @@
           <a:p>
             <a:fld id="{77734EDB-3B6B-CA48-BB41-C96E8374FD30}" type="datetimeFigureOut">
               <a:rPr lang="en-US" smtClean="0"/>
-              <a:t>4/4/21</a:t>
+              <a:t>4/5/21</a:t>
             </a:fld>
             <a:endParaRPr lang="en-US"/>
           </a:p>
@@ -880,7 +880,7 @@
           <a:p>
             <a:fld id="{30AF97BF-8750-4713-9C5B-3A2A8059BBA3}" type="datetimeFigureOut">
               <a:rPr lang="en-US" smtClean="0"/>
-              <a:t>4/4/21</a:t>
+              <a:t>4/5/21</a:t>
             </a:fld>
             <a:endParaRPr lang="en-US"/>
           </a:p>
@@ -1050,7 +1050,7 @@
           <a:p>
             <a:fld id="{30AF97BF-8750-4713-9C5B-3A2A8059BBA3}" type="datetimeFigureOut">
               <a:rPr lang="en-US" smtClean="0"/>
-              <a:t>4/4/21</a:t>
+              <a:t>4/5/21</a:t>
             </a:fld>
             <a:endParaRPr lang="en-US"/>
           </a:p>
@@ -1230,7 +1230,7 @@
           <a:p>
             <a:fld id="{30AF97BF-8750-4713-9C5B-3A2A8059BBA3}" type="datetimeFigureOut">
               <a:rPr lang="en-US" smtClean="0"/>
-              <a:t>4/4/21</a:t>
+              <a:t>4/5/21</a:t>
             </a:fld>
             <a:endParaRPr lang="en-US"/>
           </a:p>
@@ -1400,7 +1400,7 @@
           <a:p>
             <a:fld id="{30AF97BF-8750-4713-9C5B-3A2A8059BBA3}" type="datetimeFigureOut">
               <a:rPr lang="en-US" smtClean="0"/>
-              <a:t>4/4/21</a:t>
+              <a:t>4/5/21</a:t>
             </a:fld>
             <a:endParaRPr lang="en-US"/>
           </a:p>
@@ -1646,7 +1646,7 @@
           <a:p>
             <a:fld id="{30AF97BF-8750-4713-9C5B-3A2A8059BBA3}" type="datetimeFigureOut">
               <a:rPr lang="en-US" smtClean="0"/>
-              <a:t>4/4/21</a:t>
+              <a:t>4/5/21</a:t>
             </a:fld>
             <a:endParaRPr lang="en-US"/>
           </a:p>
@@ -1878,7 +1878,7 @@
           <a:p>
             <a:fld id="{30AF97BF-8750-4713-9C5B-3A2A8059BBA3}" type="datetimeFigureOut">
               <a:rPr lang="en-US" smtClean="0"/>
-              <a:t>4/4/21</a:t>
+              <a:t>4/5/21</a:t>
             </a:fld>
             <a:endParaRPr lang="en-US"/>
           </a:p>
@@ -2245,7 +2245,7 @@
           <a:p>
             <a:fld id="{30AF97BF-8750-4713-9C5B-3A2A8059BBA3}" type="datetimeFigureOut">
               <a:rPr lang="en-US" smtClean="0"/>
-              <a:t>4/4/21</a:t>
+              <a:t>4/5/21</a:t>
             </a:fld>
             <a:endParaRPr lang="en-US"/>
           </a:p>
@@ -2363,7 +2363,7 @@
           <a:p>
             <a:fld id="{30AF97BF-8750-4713-9C5B-3A2A8059BBA3}" type="datetimeFigureOut">
               <a:rPr lang="en-US" smtClean="0"/>
-              <a:t>4/4/21</a:t>
+              <a:t>4/5/21</a:t>
             </a:fld>
             <a:endParaRPr lang="en-US"/>
           </a:p>
@@ -2458,7 +2458,7 @@
           <a:p>
             <a:fld id="{30AF97BF-8750-4713-9C5B-3A2A8059BBA3}" type="datetimeFigureOut">
               <a:rPr lang="en-US" smtClean="0"/>
-              <a:t>4/4/21</a:t>
+              <a:t>4/5/21</a:t>
             </a:fld>
             <a:endParaRPr lang="en-US"/>
           </a:p>
@@ -2735,7 +2735,7 @@
           <a:p>
             <a:fld id="{30AF97BF-8750-4713-9C5B-3A2A8059BBA3}" type="datetimeFigureOut">
               <a:rPr lang="en-US" smtClean="0"/>
-              <a:t>4/4/21</a:t>
+              <a:t>4/5/21</a:t>
             </a:fld>
             <a:endParaRPr lang="en-US"/>
           </a:p>
@@ -2992,7 +2992,7 @@
           <a:p>
             <a:fld id="{30AF97BF-8750-4713-9C5B-3A2A8059BBA3}" type="datetimeFigureOut">
               <a:rPr lang="en-US" smtClean="0"/>
-              <a:t>4/4/21</a:t>
+              <a:t>4/5/21</a:t>
             </a:fld>
             <a:endParaRPr lang="en-US"/>
           </a:p>
@@ -3205,7 +3205,7 @@
           <a:p>
             <a:fld id="{30AF97BF-8750-4713-9C5B-3A2A8059BBA3}" type="datetimeFigureOut">
               <a:rPr lang="en-US" smtClean="0"/>
-              <a:t>4/4/21</a:t>
+              <a:t>4/5/21</a:t>
             </a:fld>
             <a:endParaRPr lang="en-US"/>
           </a:p>
@@ -3618,7 +3618,7 @@
         </p:nvSpPr>
         <p:spPr>
           <a:xfrm>
-            <a:off x="-79412" y="1675269"/>
+            <a:off x="513525" y="1675269"/>
             <a:ext cx="11497745" cy="1938800"/>
           </a:xfrm>
           <a:prstGeom prst="rect">
@@ -3657,7 +3657,7 @@
                 <a:cs typeface="Calibri"/>
                 <a:sym typeface="Calibri"/>
               </a:rPr>
-              <a:t>5-days of 15% PEG 3350 in drinking water (N=21)</a:t>
+              <a:t>5-days of PEG (N=21)</a:t>
             </a:r>
             <a:r>
               <a:rPr lang="en-US" sz="2000" dirty="0">
@@ -3681,7 +3681,7 @@
                 <a:cs typeface="Calibri"/>
                 <a:sym typeface="Calibri"/>
               </a:rPr>
-              <a:t>5-day PEG 3350 + </a:t>
+              <a:t>5-day PEG + </a:t>
             </a:r>
             <a:r>
               <a:rPr lang="en-US" sz="2000" dirty="0" err="1">
@@ -3716,29 +3716,7 @@
                 <a:cs typeface="Calibri"/>
                 <a:sym typeface="Calibri"/>
               </a:rPr>
-              <a:t>5-day PEG 3350 + 10-day recovery </a:t>
-            </a:r>
-            <a:r>
-              <a:rPr lang="en-US" sz="2000">
-                <a:solidFill>
-                  <a:srgbClr val="225EA8"/>
-                </a:solidFill>
-                <a:ea typeface="Calibri"/>
-                <a:cs typeface="Calibri"/>
-                <a:sym typeface="Calibri"/>
-              </a:rPr>
-              <a:t>(N=12</a:t>
-            </a:r>
-            <a:r>
-              <a:rPr lang="en-US" sz="2000" dirty="0">
-                <a:solidFill>
-                  <a:srgbClr val="225EA8"/>
-                </a:solidFill>
-                <a:ea typeface="Calibri"/>
-                <a:cs typeface="Calibri"/>
-                <a:sym typeface="Calibri"/>
-              </a:rPr>
-              <a:t>)</a:t>
+              <a:t>5-day PEG + 10-day recovery (N=12)</a:t>
             </a:r>
           </a:p>
           <a:p>

</xml_diff>

<commit_message>
Update all figures to include the latest version of the plts
</commit_message>
<xml_diff>
--- a/results/figures/5_days_PEG_exp_schematic.pptx
+++ b/results/figures/5_days_PEG_exp_schematic.pptx
@@ -197,7 +197,7 @@
           <a:p>
             <a:fld id="{77734EDB-3B6B-CA48-BB41-C96E8374FD30}" type="datetimeFigureOut">
               <a:rPr lang="en-US" smtClean="0"/>
-              <a:t>4/5/21</a:t>
+              <a:t>4/7/21</a:t>
             </a:fld>
             <a:endParaRPr lang="en-US"/>
           </a:p>
@@ -880,7 +880,7 @@
           <a:p>
             <a:fld id="{30AF97BF-8750-4713-9C5B-3A2A8059BBA3}" type="datetimeFigureOut">
               <a:rPr lang="en-US" smtClean="0"/>
-              <a:t>4/5/21</a:t>
+              <a:t>4/7/21</a:t>
             </a:fld>
             <a:endParaRPr lang="en-US"/>
           </a:p>
@@ -1050,7 +1050,7 @@
           <a:p>
             <a:fld id="{30AF97BF-8750-4713-9C5B-3A2A8059BBA3}" type="datetimeFigureOut">
               <a:rPr lang="en-US" smtClean="0"/>
-              <a:t>4/5/21</a:t>
+              <a:t>4/7/21</a:t>
             </a:fld>
             <a:endParaRPr lang="en-US"/>
           </a:p>
@@ -1230,7 +1230,7 @@
           <a:p>
             <a:fld id="{30AF97BF-8750-4713-9C5B-3A2A8059BBA3}" type="datetimeFigureOut">
               <a:rPr lang="en-US" smtClean="0"/>
-              <a:t>4/5/21</a:t>
+              <a:t>4/7/21</a:t>
             </a:fld>
             <a:endParaRPr lang="en-US"/>
           </a:p>
@@ -1400,7 +1400,7 @@
           <a:p>
             <a:fld id="{30AF97BF-8750-4713-9C5B-3A2A8059BBA3}" type="datetimeFigureOut">
               <a:rPr lang="en-US" smtClean="0"/>
-              <a:t>4/5/21</a:t>
+              <a:t>4/7/21</a:t>
             </a:fld>
             <a:endParaRPr lang="en-US"/>
           </a:p>
@@ -1646,7 +1646,7 @@
           <a:p>
             <a:fld id="{30AF97BF-8750-4713-9C5B-3A2A8059BBA3}" type="datetimeFigureOut">
               <a:rPr lang="en-US" smtClean="0"/>
-              <a:t>4/5/21</a:t>
+              <a:t>4/7/21</a:t>
             </a:fld>
             <a:endParaRPr lang="en-US"/>
           </a:p>
@@ -1878,7 +1878,7 @@
           <a:p>
             <a:fld id="{30AF97BF-8750-4713-9C5B-3A2A8059BBA3}" type="datetimeFigureOut">
               <a:rPr lang="en-US" smtClean="0"/>
-              <a:t>4/5/21</a:t>
+              <a:t>4/7/21</a:t>
             </a:fld>
             <a:endParaRPr lang="en-US"/>
           </a:p>
@@ -2245,7 +2245,7 @@
           <a:p>
             <a:fld id="{30AF97BF-8750-4713-9C5B-3A2A8059BBA3}" type="datetimeFigureOut">
               <a:rPr lang="en-US" smtClean="0"/>
-              <a:t>4/5/21</a:t>
+              <a:t>4/7/21</a:t>
             </a:fld>
             <a:endParaRPr lang="en-US"/>
           </a:p>
@@ -2363,7 +2363,7 @@
           <a:p>
             <a:fld id="{30AF97BF-8750-4713-9C5B-3A2A8059BBA3}" type="datetimeFigureOut">
               <a:rPr lang="en-US" smtClean="0"/>
-              <a:t>4/5/21</a:t>
+              <a:t>4/7/21</a:t>
             </a:fld>
             <a:endParaRPr lang="en-US"/>
           </a:p>
@@ -2458,7 +2458,7 @@
           <a:p>
             <a:fld id="{30AF97BF-8750-4713-9C5B-3A2A8059BBA3}" type="datetimeFigureOut">
               <a:rPr lang="en-US" smtClean="0"/>
-              <a:t>4/5/21</a:t>
+              <a:t>4/7/21</a:t>
             </a:fld>
             <a:endParaRPr lang="en-US"/>
           </a:p>
@@ -2735,7 +2735,7 @@
           <a:p>
             <a:fld id="{30AF97BF-8750-4713-9C5B-3A2A8059BBA3}" type="datetimeFigureOut">
               <a:rPr lang="en-US" smtClean="0"/>
-              <a:t>4/5/21</a:t>
+              <a:t>4/7/21</a:t>
             </a:fld>
             <a:endParaRPr lang="en-US"/>
           </a:p>
@@ -2992,7 +2992,7 @@
           <a:p>
             <a:fld id="{30AF97BF-8750-4713-9C5B-3A2A8059BBA3}" type="datetimeFigureOut">
               <a:rPr lang="en-US" smtClean="0"/>
-              <a:t>4/5/21</a:t>
+              <a:t>4/7/21</a:t>
             </a:fld>
             <a:endParaRPr lang="en-US"/>
           </a:p>
@@ -3205,7 +3205,7 @@
           <a:p>
             <a:fld id="{30AF97BF-8750-4713-9C5B-3A2A8059BBA3}" type="datetimeFigureOut">
               <a:rPr lang="en-US" smtClean="0"/>
-              <a:t>4/5/21</a:t>
+              <a:t>4/7/21</a:t>
             </a:fld>
             <a:endParaRPr lang="en-US"/>
           </a:p>
@@ -3649,6 +3649,17 @@
           </a:p>
           <a:p>
             <a:r>
+              <a:rPr lang="en-US" sz="2000">
+                <a:solidFill>
+                  <a:srgbClr val="88419D"/>
+                </a:solidFill>
+                <a:ea typeface="Calibri"/>
+                <a:cs typeface="Calibri"/>
+                <a:sym typeface="Calibri"/>
+              </a:rPr>
+              <a:t>5-day PEG </a:t>
+            </a:r>
+            <a:r>
               <a:rPr lang="en-US" sz="2000" dirty="0">
                 <a:solidFill>
                   <a:srgbClr val="88419D"/>
@@ -3657,7 +3668,7 @@
                 <a:cs typeface="Calibri"/>
                 <a:sym typeface="Calibri"/>
               </a:rPr>
-              <a:t>5-days of PEG (N=21)</a:t>
+              <a:t>(N=21)</a:t>
             </a:r>
             <a:r>
               <a:rPr lang="en-US" sz="2000" dirty="0">

</xml_diff>

<commit_message>
Add weight data through day 3- to figure, add schematic edits
</commit_message>
<xml_diff>
--- a/results/figures/5_days_PEG_exp_schematic.pptx
+++ b/results/figures/5_days_PEG_exp_schematic.pptx
@@ -197,7 +197,7 @@
           <a:p>
             <a:fld id="{77734EDB-3B6B-CA48-BB41-C96E8374FD30}" type="datetimeFigureOut">
               <a:rPr lang="en-US" smtClean="0"/>
-              <a:t>4/7/21</a:t>
+              <a:t>4/13/21</a:t>
             </a:fld>
             <a:endParaRPr lang="en-US"/>
           </a:p>
@@ -880,7 +880,7 @@
           <a:p>
             <a:fld id="{30AF97BF-8750-4713-9C5B-3A2A8059BBA3}" type="datetimeFigureOut">
               <a:rPr lang="en-US" smtClean="0"/>
-              <a:t>4/7/21</a:t>
+              <a:t>4/13/21</a:t>
             </a:fld>
             <a:endParaRPr lang="en-US"/>
           </a:p>
@@ -1050,7 +1050,7 @@
           <a:p>
             <a:fld id="{30AF97BF-8750-4713-9C5B-3A2A8059BBA3}" type="datetimeFigureOut">
               <a:rPr lang="en-US" smtClean="0"/>
-              <a:t>4/7/21</a:t>
+              <a:t>4/13/21</a:t>
             </a:fld>
             <a:endParaRPr lang="en-US"/>
           </a:p>
@@ -1230,7 +1230,7 @@
           <a:p>
             <a:fld id="{30AF97BF-8750-4713-9C5B-3A2A8059BBA3}" type="datetimeFigureOut">
               <a:rPr lang="en-US" smtClean="0"/>
-              <a:t>4/7/21</a:t>
+              <a:t>4/13/21</a:t>
             </a:fld>
             <a:endParaRPr lang="en-US"/>
           </a:p>
@@ -1400,7 +1400,7 @@
           <a:p>
             <a:fld id="{30AF97BF-8750-4713-9C5B-3A2A8059BBA3}" type="datetimeFigureOut">
               <a:rPr lang="en-US" smtClean="0"/>
-              <a:t>4/7/21</a:t>
+              <a:t>4/13/21</a:t>
             </a:fld>
             <a:endParaRPr lang="en-US"/>
           </a:p>
@@ -1646,7 +1646,7 @@
           <a:p>
             <a:fld id="{30AF97BF-8750-4713-9C5B-3A2A8059BBA3}" type="datetimeFigureOut">
               <a:rPr lang="en-US" smtClean="0"/>
-              <a:t>4/7/21</a:t>
+              <a:t>4/13/21</a:t>
             </a:fld>
             <a:endParaRPr lang="en-US"/>
           </a:p>
@@ -1878,7 +1878,7 @@
           <a:p>
             <a:fld id="{30AF97BF-8750-4713-9C5B-3A2A8059BBA3}" type="datetimeFigureOut">
               <a:rPr lang="en-US" smtClean="0"/>
-              <a:t>4/7/21</a:t>
+              <a:t>4/13/21</a:t>
             </a:fld>
             <a:endParaRPr lang="en-US"/>
           </a:p>
@@ -2245,7 +2245,7 @@
           <a:p>
             <a:fld id="{30AF97BF-8750-4713-9C5B-3A2A8059BBA3}" type="datetimeFigureOut">
               <a:rPr lang="en-US" smtClean="0"/>
-              <a:t>4/7/21</a:t>
+              <a:t>4/13/21</a:t>
             </a:fld>
             <a:endParaRPr lang="en-US"/>
           </a:p>
@@ -2363,7 +2363,7 @@
           <a:p>
             <a:fld id="{30AF97BF-8750-4713-9C5B-3A2A8059BBA3}" type="datetimeFigureOut">
               <a:rPr lang="en-US" smtClean="0"/>
-              <a:t>4/7/21</a:t>
+              <a:t>4/13/21</a:t>
             </a:fld>
             <a:endParaRPr lang="en-US"/>
           </a:p>
@@ -2458,7 +2458,7 @@
           <a:p>
             <a:fld id="{30AF97BF-8750-4713-9C5B-3A2A8059BBA3}" type="datetimeFigureOut">
               <a:rPr lang="en-US" smtClean="0"/>
-              <a:t>4/7/21</a:t>
+              <a:t>4/13/21</a:t>
             </a:fld>
             <a:endParaRPr lang="en-US"/>
           </a:p>
@@ -2735,7 +2735,7 @@
           <a:p>
             <a:fld id="{30AF97BF-8750-4713-9C5B-3A2A8059BBA3}" type="datetimeFigureOut">
               <a:rPr lang="en-US" smtClean="0"/>
-              <a:t>4/7/21</a:t>
+              <a:t>4/13/21</a:t>
             </a:fld>
             <a:endParaRPr lang="en-US"/>
           </a:p>
@@ -2992,7 +2992,7 @@
           <a:p>
             <a:fld id="{30AF97BF-8750-4713-9C5B-3A2A8059BBA3}" type="datetimeFigureOut">
               <a:rPr lang="en-US" smtClean="0"/>
-              <a:t>4/7/21</a:t>
+              <a:t>4/13/21</a:t>
             </a:fld>
             <a:endParaRPr lang="en-US"/>
           </a:p>
@@ -3205,7 +3205,7 @@
           <a:p>
             <a:fld id="{30AF97BF-8750-4713-9C5B-3A2A8059BBA3}" type="datetimeFigureOut">
               <a:rPr lang="en-US" smtClean="0"/>
-              <a:t>4/7/21</a:t>
+              <a:t>4/13/21</a:t>
             </a:fld>
             <a:endParaRPr lang="en-US"/>
           </a:p>
@@ -3644,21 +3644,10 @@
                 <a:cs typeface="Calibri"/>
                 <a:sym typeface="Calibri"/>
               </a:rPr>
-              <a:t>Clindamycin: 10mg/kg (N=20)</a:t>
-            </a:r>
-          </a:p>
-          <a:p>
-            <a:r>
-              <a:rPr lang="en-US" sz="2000">
-                <a:solidFill>
-                  <a:srgbClr val="88419D"/>
-                </a:solidFill>
-                <a:ea typeface="Calibri"/>
-                <a:cs typeface="Calibri"/>
-                <a:sym typeface="Calibri"/>
-              </a:rPr>
-              <a:t>5-day PEG </a:t>
-            </a:r>
+              <a:t>Clindamycin (N=20)</a:t>
+            </a:r>
+          </a:p>
+          <a:p>
             <a:r>
               <a:rPr lang="en-US" sz="2000" dirty="0">
                 <a:solidFill>
@@ -3668,7 +3657,7 @@
                 <a:cs typeface="Calibri"/>
                 <a:sym typeface="Calibri"/>
               </a:rPr>
-              <a:t>(N=21)</a:t>
+              <a:t>5-day PEG (N=21)</a:t>
             </a:r>
             <a:r>
               <a:rPr lang="en-US" sz="2000" dirty="0">
@@ -4768,10 +4757,10 @@
         </p:nvGrpSpPr>
         <p:grpSpPr>
           <a:xfrm>
-            <a:off x="1120854" y="533604"/>
-            <a:ext cx="5042380" cy="474050"/>
-            <a:chOff x="5703840" y="1733513"/>
-            <a:chExt cx="5042380" cy="474050"/>
+            <a:off x="1071397" y="533604"/>
+            <a:ext cx="1722690" cy="474050"/>
+            <a:chOff x="5654383" y="1733513"/>
+            <a:chExt cx="1722690" cy="474050"/>
           </a:xfrm>
         </p:grpSpPr>
         <p:sp>
@@ -4843,8 +4832,8 @@
           </p:nvSpPr>
           <p:spPr>
             <a:xfrm>
-              <a:off x="5703840" y="1795366"/>
-              <a:ext cx="5042380" cy="337083"/>
+              <a:off x="5654383" y="1788264"/>
+              <a:ext cx="1699642" cy="337083"/>
             </a:xfrm>
             <a:prstGeom prst="rect">
               <a:avLst/>
@@ -4860,6 +4849,7 @@
             </a:bodyPr>
             <a:lstStyle/>
             <a:p>
+              <a:pPr algn="ctr"/>
               <a:r>
                 <a:rPr lang="en-US" dirty="0">
                   <a:solidFill>
@@ -4869,7 +4859,7 @@
                   <a:cs typeface="Calibri"/>
                   <a:sym typeface="Calibri"/>
                 </a:rPr>
-                <a:t>15% PEG 3350</a:t>
+                <a:t>PEG</a:t>
               </a:r>
             </a:p>
           </p:txBody>
@@ -4975,254 +4965,12 @@
           </a:p>
         </p:txBody>
       </p:sp>
-      <p:grpSp>
-        <p:nvGrpSpPr>
-          <p:cNvPr id="2" name="Group 1">
+      <p:sp>
+        <p:nvSpPr>
+          <p:cNvPr id="103" name="Google Shape;703;p64">
             <a:extLst>
               <a:ext uri="{FF2B5EF4-FFF2-40B4-BE49-F238E27FC236}">
-                <a16:creationId xmlns:a16="http://schemas.microsoft.com/office/drawing/2014/main" id="{2DD20CB5-C512-DE4C-BBA1-7DB63BAC5C31}"/>
-              </a:ext>
-            </a:extLst>
-          </p:cNvPr>
-          <p:cNvGrpSpPr/>
-          <p:nvPr/>
-        </p:nvGrpSpPr>
-        <p:grpSpPr>
-          <a:xfrm>
-            <a:off x="4137282" y="438043"/>
-            <a:ext cx="4167257" cy="490016"/>
-            <a:chOff x="5833478" y="1888848"/>
-            <a:chExt cx="4167256" cy="490016"/>
-          </a:xfrm>
-        </p:grpSpPr>
-        <p:sp>
-          <p:nvSpPr>
-            <p:cNvPr id="103" name="Google Shape;703;p64">
-              <a:extLst>
-                <a:ext uri="{FF2B5EF4-FFF2-40B4-BE49-F238E27FC236}">
-                  <a16:creationId xmlns:a16="http://schemas.microsoft.com/office/drawing/2014/main" id="{7141E65F-9AC3-E04B-9BD2-F5244967B01B}"/>
-                </a:ext>
-              </a:extLst>
-            </p:cNvPr>
-            <p:cNvSpPr/>
-            <p:nvPr/>
-          </p:nvSpPr>
-          <p:spPr>
-            <a:xfrm rot="16200000">
-              <a:off x="6437597" y="1331676"/>
-              <a:ext cx="490016" cy="1604359"/>
-            </a:xfrm>
-            <a:prstGeom prst="downArrow">
-              <a:avLst>
-                <a:gd name="adj1" fmla="val 50000"/>
-                <a:gd name="adj2" fmla="val 50000"/>
-              </a:avLst>
-            </a:prstGeom>
-            <a:solidFill>
-              <a:srgbClr val="88419D"/>
-            </a:solidFill>
-            <a:ln w="12700" cap="flat" cmpd="sng">
-              <a:solidFill>
-                <a:srgbClr val="88419D"/>
-              </a:solidFill>
-              <a:prstDash val="solid"/>
-              <a:miter lim="800000"/>
-              <a:headEnd type="none" w="sm" len="sm"/>
-              <a:tailEnd type="none" w="sm" len="sm"/>
-            </a:ln>
-          </p:spPr>
-          <p:txBody>
-            <a:bodyPr spcFirstLastPara="1" wrap="square" lIns="91433" tIns="45700" rIns="91433" bIns="45700" anchor="ctr" anchorCtr="0">
-              <a:noAutofit/>
-            </a:bodyPr>
-            <a:lstStyle/>
-            <a:p>
-              <a:pPr algn="ctr"/>
-              <a:endParaRPr sz="1868" dirty="0">
-                <a:solidFill>
-                  <a:schemeClr val="lt1"/>
-                </a:solidFill>
-                <a:latin typeface="Calibri"/>
-                <a:ea typeface="Calibri"/>
-                <a:cs typeface="Calibri"/>
-                <a:sym typeface="Calibri"/>
-              </a:endParaRPr>
-            </a:p>
-          </p:txBody>
-        </p:sp>
-        <p:sp>
-          <p:nvSpPr>
-            <p:cNvPr id="104" name="Google Shape;677;p64">
-              <a:extLst>
-                <a:ext uri="{FF2B5EF4-FFF2-40B4-BE49-F238E27FC236}">
-                  <a16:creationId xmlns:a16="http://schemas.microsoft.com/office/drawing/2014/main" id="{F7FD4144-D484-974E-89BF-3FB358C589F3}"/>
-                </a:ext>
-              </a:extLst>
-            </p:cNvPr>
-            <p:cNvSpPr/>
-            <p:nvPr/>
-          </p:nvSpPr>
-          <p:spPr>
-            <a:xfrm>
-              <a:off x="5833478" y="1950700"/>
-              <a:ext cx="4167256" cy="337083"/>
-            </a:xfrm>
-            <a:prstGeom prst="rect">
-              <a:avLst/>
-            </a:prstGeom>
-            <a:noFill/>
-            <a:ln>
-              <a:noFill/>
-            </a:ln>
-          </p:spPr>
-          <p:txBody>
-            <a:bodyPr spcFirstLastPara="1" wrap="square" lIns="91433" tIns="45700" rIns="91433" bIns="45700" anchor="t" anchorCtr="0">
-              <a:noAutofit/>
-            </a:bodyPr>
-            <a:lstStyle/>
-            <a:p>
-              <a:r>
-                <a:rPr lang="en-US" dirty="0">
-                  <a:solidFill>
-                    <a:schemeClr val="bg1"/>
-                  </a:solidFill>
-                  <a:ea typeface="Calibri"/>
-                  <a:cs typeface="Calibri"/>
-                  <a:sym typeface="Calibri"/>
-                </a:rPr>
-                <a:t>15% PEG 3350</a:t>
-              </a:r>
-            </a:p>
-          </p:txBody>
-        </p:sp>
-      </p:grpSp>
-      <p:grpSp>
-        <p:nvGrpSpPr>
-          <p:cNvPr id="5" name="Group 4">
-            <a:extLst>
-              <a:ext uri="{FF2B5EF4-FFF2-40B4-BE49-F238E27FC236}">
-                <a16:creationId xmlns:a16="http://schemas.microsoft.com/office/drawing/2014/main" id="{32609399-FB07-294A-9646-304C14A218CF}"/>
-              </a:ext>
-            </a:extLst>
-          </p:cNvPr>
-          <p:cNvGrpSpPr/>
-          <p:nvPr/>
-        </p:nvGrpSpPr>
-        <p:grpSpPr>
-          <a:xfrm>
-            <a:off x="4125406" y="15412"/>
-            <a:ext cx="4167257" cy="478575"/>
-            <a:chOff x="5704199" y="2522728"/>
-            <a:chExt cx="4167256" cy="478575"/>
-          </a:xfrm>
-        </p:grpSpPr>
-        <p:sp>
-          <p:nvSpPr>
-            <p:cNvPr id="106" name="Google Shape;703;p64">
-              <a:extLst>
-                <a:ext uri="{FF2B5EF4-FFF2-40B4-BE49-F238E27FC236}">
-                  <a16:creationId xmlns:a16="http://schemas.microsoft.com/office/drawing/2014/main" id="{E90320E3-4478-4A40-8F2D-65FF1301B113}"/>
-                </a:ext>
-              </a:extLst>
-            </p:cNvPr>
-            <p:cNvSpPr/>
-            <p:nvPr/>
-          </p:nvSpPr>
-          <p:spPr>
-            <a:xfrm rot="16200000">
-              <a:off x="6325914" y="1959836"/>
-              <a:ext cx="478575" cy="1604359"/>
-            </a:xfrm>
-            <a:prstGeom prst="downArrow">
-              <a:avLst>
-                <a:gd name="adj1" fmla="val 50000"/>
-                <a:gd name="adj2" fmla="val 50000"/>
-              </a:avLst>
-            </a:prstGeom>
-            <a:solidFill>
-              <a:srgbClr val="F768A1"/>
-            </a:solidFill>
-            <a:ln w="12700" cap="flat" cmpd="sng">
-              <a:solidFill>
-                <a:srgbClr val="F768A1"/>
-              </a:solidFill>
-              <a:prstDash val="solid"/>
-              <a:miter lim="800000"/>
-              <a:headEnd type="none" w="sm" len="sm"/>
-              <a:tailEnd type="none" w="sm" len="sm"/>
-            </a:ln>
-          </p:spPr>
-          <p:txBody>
-            <a:bodyPr spcFirstLastPara="1" wrap="square" lIns="91433" tIns="45700" rIns="91433" bIns="45700" anchor="ctr" anchorCtr="0">
-              <a:noAutofit/>
-            </a:bodyPr>
-            <a:lstStyle/>
-            <a:p>
-              <a:pPr algn="ctr"/>
-              <a:endParaRPr sz="1868" dirty="0">
-                <a:solidFill>
-                  <a:schemeClr val="lt1"/>
-                </a:solidFill>
-                <a:latin typeface="Calibri"/>
-                <a:ea typeface="Calibri"/>
-                <a:cs typeface="Calibri"/>
-                <a:sym typeface="Calibri"/>
-              </a:endParaRPr>
-            </a:p>
-          </p:txBody>
-        </p:sp>
-        <p:sp>
-          <p:nvSpPr>
-            <p:cNvPr id="107" name="Google Shape;677;p64">
-              <a:extLst>
-                <a:ext uri="{FF2B5EF4-FFF2-40B4-BE49-F238E27FC236}">
-                  <a16:creationId xmlns:a16="http://schemas.microsoft.com/office/drawing/2014/main" id="{F53D8D8F-523A-D446-9A57-EE84DA4DB3DC}"/>
-                </a:ext>
-              </a:extLst>
-            </p:cNvPr>
-            <p:cNvSpPr/>
-            <p:nvPr/>
-          </p:nvSpPr>
-          <p:spPr>
-            <a:xfrm>
-              <a:off x="5704199" y="2586736"/>
-              <a:ext cx="4167256" cy="337083"/>
-            </a:xfrm>
-            <a:prstGeom prst="rect">
-              <a:avLst/>
-            </a:prstGeom>
-            <a:noFill/>
-            <a:ln>
-              <a:noFill/>
-            </a:ln>
-          </p:spPr>
-          <p:txBody>
-            <a:bodyPr spcFirstLastPara="1" wrap="square" lIns="91433" tIns="45700" rIns="91433" bIns="45700" anchor="t" anchorCtr="0">
-              <a:noAutofit/>
-            </a:bodyPr>
-            <a:lstStyle/>
-            <a:p>
-              <a:r>
-                <a:rPr lang="en-US" dirty="0">
-                  <a:solidFill>
-                    <a:schemeClr val="bg1"/>
-                  </a:solidFill>
-                  <a:ea typeface="Calibri"/>
-                  <a:cs typeface="Calibri"/>
-                  <a:sym typeface="Calibri"/>
-                </a:rPr>
-                <a:t>15% PEG 3350</a:t>
-              </a:r>
-            </a:p>
-          </p:txBody>
-        </p:sp>
-      </p:grpSp>
-      <p:sp>
-        <p:nvSpPr>
-          <p:cNvPr id="108" name="Google Shape;655;p64">
-            <a:extLst>
-              <a:ext uri="{FF2B5EF4-FFF2-40B4-BE49-F238E27FC236}">
-                <a16:creationId xmlns:a16="http://schemas.microsoft.com/office/drawing/2014/main" id="{3431068F-D2A3-AD47-B163-B52F4743AACF}"/>
+                <a16:creationId xmlns:a16="http://schemas.microsoft.com/office/drawing/2014/main" id="{7141E65F-9AC3-E04B-9BD2-F5244967B01B}"/>
               </a:ext>
             </a:extLst>
           </p:cNvPr>
@@ -5230,9 +4978,64 @@
           <p:nvPr/>
         </p:nvSpPr>
         <p:spPr>
-          <a:xfrm rot="10800000" flipH="1">
-            <a:off x="5312474" y="1633598"/>
-            <a:ext cx="232030" cy="281318"/>
+          <a:xfrm rot="16200000">
+            <a:off x="4741401" y="-119129"/>
+            <a:ext cx="490016" cy="1604359"/>
+          </a:xfrm>
+          <a:prstGeom prst="downArrow">
+            <a:avLst>
+              <a:gd name="adj1" fmla="val 50000"/>
+              <a:gd name="adj2" fmla="val 50000"/>
+            </a:avLst>
+          </a:prstGeom>
+          <a:solidFill>
+            <a:srgbClr val="88419D"/>
+          </a:solidFill>
+          <a:ln w="12700" cap="flat" cmpd="sng">
+            <a:solidFill>
+              <a:srgbClr val="88419D"/>
+            </a:solidFill>
+            <a:prstDash val="solid"/>
+            <a:miter lim="800000"/>
+            <a:headEnd type="none" w="sm" len="sm"/>
+            <a:tailEnd type="none" w="sm" len="sm"/>
+          </a:ln>
+        </p:spPr>
+        <p:txBody>
+          <a:bodyPr spcFirstLastPara="1" wrap="square" lIns="91433" tIns="45700" rIns="91433" bIns="45700" anchor="ctr" anchorCtr="0">
+            <a:noAutofit/>
+          </a:bodyPr>
+          <a:lstStyle/>
+          <a:p>
+            <a:pPr algn="ctr"/>
+            <a:endParaRPr sz="1868" dirty="0">
+              <a:solidFill>
+                <a:schemeClr val="lt1"/>
+              </a:solidFill>
+              <a:latin typeface="Calibri"/>
+              <a:ea typeface="Calibri"/>
+              <a:cs typeface="Calibri"/>
+              <a:sym typeface="Calibri"/>
+            </a:endParaRPr>
+          </a:p>
+        </p:txBody>
+      </p:sp>
+      <p:sp>
+        <p:nvSpPr>
+          <p:cNvPr id="106" name="Google Shape;703;p64">
+            <a:extLst>
+              <a:ext uri="{FF2B5EF4-FFF2-40B4-BE49-F238E27FC236}">
+                <a16:creationId xmlns:a16="http://schemas.microsoft.com/office/drawing/2014/main" id="{E90320E3-4478-4A40-8F2D-65FF1301B113}"/>
+              </a:ext>
+            </a:extLst>
+          </p:cNvPr>
+          <p:cNvSpPr/>
+          <p:nvPr/>
+        </p:nvSpPr>
+        <p:spPr>
+          <a:xfrm rot="16200000">
+            <a:off x="4747121" y="-547480"/>
+            <a:ext cx="478575" cy="1604359"/>
           </a:xfrm>
           <a:prstGeom prst="downArrow">
             <a:avLst>
@@ -5260,6 +5063,61 @@
           <a:lstStyle/>
           <a:p>
             <a:pPr algn="ctr"/>
+            <a:endParaRPr sz="1868" dirty="0">
+              <a:solidFill>
+                <a:schemeClr val="lt1"/>
+              </a:solidFill>
+              <a:latin typeface="Calibri"/>
+              <a:ea typeface="Calibri"/>
+              <a:cs typeface="Calibri"/>
+              <a:sym typeface="Calibri"/>
+            </a:endParaRPr>
+          </a:p>
+        </p:txBody>
+      </p:sp>
+      <p:sp>
+        <p:nvSpPr>
+          <p:cNvPr id="108" name="Google Shape;655;p64">
+            <a:extLst>
+              <a:ext uri="{FF2B5EF4-FFF2-40B4-BE49-F238E27FC236}">
+                <a16:creationId xmlns:a16="http://schemas.microsoft.com/office/drawing/2014/main" id="{3431068F-D2A3-AD47-B163-B52F4743AACF}"/>
+              </a:ext>
+            </a:extLst>
+          </p:cNvPr>
+          <p:cNvSpPr/>
+          <p:nvPr/>
+        </p:nvSpPr>
+        <p:spPr>
+          <a:xfrm rot="10800000" flipH="1">
+            <a:off x="5312474" y="1633598"/>
+            <a:ext cx="232030" cy="281318"/>
+          </a:xfrm>
+          <a:prstGeom prst="downArrow">
+            <a:avLst>
+              <a:gd name="adj1" fmla="val 50000"/>
+              <a:gd name="adj2" fmla="val 50000"/>
+            </a:avLst>
+          </a:prstGeom>
+          <a:solidFill>
+            <a:srgbClr val="F768A1"/>
+          </a:solidFill>
+          <a:ln w="12700" cap="flat" cmpd="sng">
+            <a:solidFill>
+              <a:srgbClr val="F768A1"/>
+            </a:solidFill>
+            <a:prstDash val="solid"/>
+            <a:miter lim="800000"/>
+            <a:headEnd type="none" w="sm" len="sm"/>
+            <a:tailEnd type="none" w="sm" len="sm"/>
+          </a:ln>
+        </p:spPr>
+        <p:txBody>
+          <a:bodyPr spcFirstLastPara="1" wrap="square" lIns="91433" tIns="45700" rIns="91433" bIns="45700" anchor="ctr" anchorCtr="0">
+            <a:noAutofit/>
+          </a:bodyPr>
+          <a:lstStyle/>
+          <a:p>
+            <a:pPr algn="ctr"/>
             <a:endParaRPr sz="1868">
               <a:solidFill>
                 <a:schemeClr val="lt1"/>
@@ -5404,6 +5262,98 @@
               <a:cs typeface="Calibri"/>
               <a:sym typeface="Calibri"/>
             </a:endParaRPr>
+          </a:p>
+        </p:txBody>
+      </p:sp>
+      <p:sp>
+        <p:nvSpPr>
+          <p:cNvPr id="42" name="Google Shape;677;p64">
+            <a:extLst>
+              <a:ext uri="{FF2B5EF4-FFF2-40B4-BE49-F238E27FC236}">
+                <a16:creationId xmlns:a16="http://schemas.microsoft.com/office/drawing/2014/main" id="{D04B2902-F559-4A4C-8547-B12D0C1CA4FB}"/>
+              </a:ext>
+            </a:extLst>
+          </p:cNvPr>
+          <p:cNvSpPr/>
+          <p:nvPr/>
+        </p:nvSpPr>
+        <p:spPr>
+          <a:xfrm>
+            <a:off x="4038334" y="68600"/>
+            <a:ext cx="1699642" cy="337083"/>
+          </a:xfrm>
+          <a:prstGeom prst="rect">
+            <a:avLst/>
+          </a:prstGeom>
+          <a:noFill/>
+          <a:ln>
+            <a:noFill/>
+          </a:ln>
+        </p:spPr>
+        <p:txBody>
+          <a:bodyPr spcFirstLastPara="1" wrap="square" lIns="91433" tIns="45700" rIns="91433" bIns="45700" anchor="t" anchorCtr="0">
+            <a:noAutofit/>
+          </a:bodyPr>
+          <a:lstStyle/>
+          <a:p>
+            <a:pPr algn="ctr"/>
+            <a:r>
+              <a:rPr lang="en-US" dirty="0">
+                <a:solidFill>
+                  <a:schemeClr val="bg1"/>
+                </a:solidFill>
+                <a:ea typeface="Calibri"/>
+                <a:cs typeface="Calibri"/>
+                <a:sym typeface="Calibri"/>
+              </a:rPr>
+              <a:t>PEG</a:t>
+            </a:r>
+          </a:p>
+        </p:txBody>
+      </p:sp>
+      <p:sp>
+        <p:nvSpPr>
+          <p:cNvPr id="43" name="Google Shape;677;p64">
+            <a:extLst>
+              <a:ext uri="{FF2B5EF4-FFF2-40B4-BE49-F238E27FC236}">
+                <a16:creationId xmlns:a16="http://schemas.microsoft.com/office/drawing/2014/main" id="{4142419B-F094-BA47-B491-3E4569FE01B9}"/>
+              </a:ext>
+            </a:extLst>
+          </p:cNvPr>
+          <p:cNvSpPr/>
+          <p:nvPr/>
+        </p:nvSpPr>
+        <p:spPr>
+          <a:xfrm>
+            <a:off x="4042747" y="496074"/>
+            <a:ext cx="1699642" cy="337083"/>
+          </a:xfrm>
+          <a:prstGeom prst="rect">
+            <a:avLst/>
+          </a:prstGeom>
+          <a:noFill/>
+          <a:ln>
+            <a:noFill/>
+          </a:ln>
+        </p:spPr>
+        <p:txBody>
+          <a:bodyPr spcFirstLastPara="1" wrap="square" lIns="91433" tIns="45700" rIns="91433" bIns="45700" anchor="t" anchorCtr="0">
+            <a:noAutofit/>
+          </a:bodyPr>
+          <a:lstStyle/>
+          <a:p>
+            <a:pPr algn="ctr"/>
+            <a:r>
+              <a:rPr lang="en-US" dirty="0">
+                <a:solidFill>
+                  <a:schemeClr val="bg1"/>
+                </a:solidFill>
+                <a:ea typeface="Calibri"/>
+                <a:cs typeface="Calibri"/>
+                <a:sym typeface="Calibri"/>
+              </a:rPr>
+              <a:t>PEG</a:t>
+            </a:r>
           </a:p>
         </p:txBody>
       </p:sp>
@@ -5480,41 +5430,6 @@
                                   </p:childTnLst>
                                 </p:cTn>
                               </p:par>
-                              <p:par>
-                                <p:cTn id="8" presetID="9" presetClass="entr" presetSubtype="0" fill="hold" nodeType="withEffect">
-                                  <p:stCondLst>
-                                    <p:cond delay="0"/>
-                                  </p:stCondLst>
-                                  <p:childTnLst>
-                                    <p:set>
-                                      <p:cBhvr>
-                                        <p:cTn id="9" dur="1" fill="hold">
-                                          <p:stCondLst>
-                                            <p:cond delay="0"/>
-                                          </p:stCondLst>
-                                        </p:cTn>
-                                        <p:tgtEl>
-                                          <p:spTgt spid="2"/>
-                                        </p:tgtEl>
-                                        <p:attrNameLst>
-                                          <p:attrName>style.visibility</p:attrName>
-                                        </p:attrNameLst>
-                                      </p:cBhvr>
-                                      <p:to>
-                                        <p:strVal val="visible"/>
-                                      </p:to>
-                                    </p:set>
-                                    <p:animEffect transition="in" filter="dissolve">
-                                      <p:cBhvr>
-                                        <p:cTn id="10" dur="500"/>
-                                        <p:tgtEl>
-                                          <p:spTgt spid="2"/>
-                                        </p:tgtEl>
-                                      </p:cBhvr>
-                                    </p:animEffect>
-                                  </p:childTnLst>
-                                </p:cTn>
-                              </p:par>
                             </p:childTnLst>
                           </p:cTn>
                         </p:par>
@@ -5522,26 +5437,26 @@
                     </p:cTn>
                   </p:par>
                   <p:par>
-                    <p:cTn id="11" fill="hold">
+                    <p:cTn id="8" fill="hold">
                       <p:stCondLst>
                         <p:cond delay="indefinite"/>
                       </p:stCondLst>
                       <p:childTnLst>
                         <p:par>
-                          <p:cTn id="12" fill="hold">
+                          <p:cTn id="9" fill="hold">
                             <p:stCondLst>
                               <p:cond delay="0"/>
                             </p:stCondLst>
                             <p:childTnLst>
                               <p:par>
-                                <p:cTn id="13" presetID="9" presetClass="entr" presetSubtype="0" fill="hold" nodeType="clickEffect">
+                                <p:cTn id="10" presetID="9" presetClass="entr" presetSubtype="0" fill="hold" nodeType="clickEffect">
                                   <p:stCondLst>
                                     <p:cond delay="0"/>
                                   </p:stCondLst>
                                   <p:childTnLst>
                                     <p:set>
                                       <p:cBhvr>
-                                        <p:cTn id="14" dur="1" fill="hold">
+                                        <p:cTn id="11" dur="1" fill="hold">
                                           <p:stCondLst>
                                             <p:cond delay="0"/>
                                           </p:stCondLst>
@@ -5563,7 +5478,7 @@
                                     </p:set>
                                     <p:animEffect transition="in" filter="dissolve">
                                       <p:cBhvr>
-                                        <p:cTn id="15" dur="500"/>
+                                        <p:cTn id="12" dur="500"/>
                                         <p:tgtEl>
                                           <p:spTgt spid="698">
                                             <p:txEl>
@@ -5577,49 +5492,14 @@
                                 </p:cTn>
                               </p:par>
                               <p:par>
-                                <p:cTn id="16" presetID="9" presetClass="entr" presetSubtype="0" fill="hold" nodeType="withEffect">
+                                <p:cTn id="13" presetID="9" presetClass="entr" presetSubtype="0" fill="hold" grpId="0" nodeType="withEffect">
                                   <p:stCondLst>
                                     <p:cond delay="0"/>
                                   </p:stCondLst>
                                   <p:childTnLst>
                                     <p:set>
                                       <p:cBhvr>
-                                        <p:cTn id="17" dur="1" fill="hold">
-                                          <p:stCondLst>
-                                            <p:cond delay="0"/>
-                                          </p:stCondLst>
-                                        </p:cTn>
-                                        <p:tgtEl>
-                                          <p:spTgt spid="5"/>
-                                        </p:tgtEl>
-                                        <p:attrNameLst>
-                                          <p:attrName>style.visibility</p:attrName>
-                                        </p:attrNameLst>
-                                      </p:cBhvr>
-                                      <p:to>
-                                        <p:strVal val="visible"/>
-                                      </p:to>
-                                    </p:set>
-                                    <p:animEffect transition="in" filter="dissolve">
-                                      <p:cBhvr>
-                                        <p:cTn id="18" dur="500"/>
-                                        <p:tgtEl>
-                                          <p:spTgt spid="5"/>
-                                        </p:tgtEl>
-                                      </p:cBhvr>
-                                    </p:animEffect>
-                                  </p:childTnLst>
-                                </p:cTn>
-                              </p:par>
-                              <p:par>
-                                <p:cTn id="19" presetID="9" presetClass="entr" presetSubtype="0" fill="hold" grpId="0" nodeType="withEffect">
-                                  <p:stCondLst>
-                                    <p:cond delay="0"/>
-                                  </p:stCondLst>
-                                  <p:childTnLst>
-                                    <p:set>
-                                      <p:cBhvr>
-                                        <p:cTn id="20" dur="1" fill="hold">
+                                        <p:cTn id="14" dur="1" fill="hold">
                                           <p:stCondLst>
                                             <p:cond delay="0"/>
                                           </p:stCondLst>
@@ -5637,7 +5517,7 @@
                                     </p:set>
                                     <p:animEffect transition="in" filter="dissolve">
                                       <p:cBhvr>
-                                        <p:cTn id="21" dur="500"/>
+                                        <p:cTn id="15" dur="500"/>
                                         <p:tgtEl>
                                           <p:spTgt spid="108"/>
                                         </p:tgtEl>
@@ -5653,26 +5533,26 @@
                     </p:cTn>
                   </p:par>
                   <p:par>
-                    <p:cTn id="22" fill="hold">
+                    <p:cTn id="16" fill="hold">
                       <p:stCondLst>
                         <p:cond delay="indefinite"/>
                       </p:stCondLst>
                       <p:childTnLst>
                         <p:par>
-                          <p:cTn id="23" fill="hold">
+                          <p:cTn id="17" fill="hold">
                             <p:stCondLst>
                               <p:cond delay="0"/>
                             </p:stCondLst>
                             <p:childTnLst>
                               <p:par>
-                                <p:cTn id="24" presetID="9" presetClass="entr" presetSubtype="0" fill="hold" nodeType="clickEffect">
+                                <p:cTn id="18" presetID="9" presetClass="entr" presetSubtype="0" fill="hold" nodeType="clickEffect">
                                   <p:stCondLst>
                                     <p:cond delay="0"/>
                                   </p:stCondLst>
                                   <p:childTnLst>
                                     <p:set>
                                       <p:cBhvr>
-                                        <p:cTn id="25" dur="1" fill="hold">
+                                        <p:cTn id="19" dur="1" fill="hold">
                                           <p:stCondLst>
                                             <p:cond delay="0"/>
                                           </p:stCondLst>
@@ -5690,7 +5570,7 @@
                                     </p:set>
                                     <p:animEffect transition="in" filter="dissolve">
                                       <p:cBhvr>
-                                        <p:cTn id="26" dur="500"/>
+                                        <p:cTn id="20" dur="500"/>
                                         <p:tgtEl>
                                           <p:spTgt spid="4"/>
                                         </p:tgtEl>
@@ -5700,14 +5580,14 @@
                                 </p:cTn>
                               </p:par>
                               <p:par>
-                                <p:cTn id="27" presetID="9" presetClass="entr" presetSubtype="0" fill="hold" nodeType="withEffect">
+                                <p:cTn id="21" presetID="9" presetClass="entr" presetSubtype="0" fill="hold" nodeType="withEffect">
                                   <p:stCondLst>
                                     <p:cond delay="0"/>
                                   </p:stCondLst>
                                   <p:childTnLst>
                                     <p:set>
                                       <p:cBhvr>
-                                        <p:cTn id="28" dur="1" fill="hold">
+                                        <p:cTn id="22" dur="1" fill="hold">
                                           <p:stCondLst>
                                             <p:cond delay="0"/>
                                           </p:stCondLst>
@@ -5729,7 +5609,7 @@
                                     </p:set>
                                     <p:animEffect transition="in" filter="dissolve">
                                       <p:cBhvr>
-                                        <p:cTn id="29" dur="500"/>
+                                        <p:cTn id="23" dur="500"/>
                                         <p:tgtEl>
                                           <p:spTgt spid="698">
                                             <p:txEl>
@@ -5743,14 +5623,14 @@
                                 </p:cTn>
                               </p:par>
                               <p:par>
-                                <p:cTn id="30" presetID="9" presetClass="entr" presetSubtype="0" fill="hold" grpId="0" nodeType="withEffect">
+                                <p:cTn id="24" presetID="9" presetClass="entr" presetSubtype="0" fill="hold" grpId="0" nodeType="withEffect">
                                   <p:stCondLst>
                                     <p:cond delay="0"/>
                                   </p:stCondLst>
                                   <p:childTnLst>
                                     <p:set>
                                       <p:cBhvr>
-                                        <p:cTn id="31" dur="1" fill="hold">
+                                        <p:cTn id="25" dur="1" fill="hold">
                                           <p:stCondLst>
                                             <p:cond delay="0"/>
                                           </p:stCondLst>
@@ -5768,7 +5648,7 @@
                                     </p:set>
                                     <p:animEffect transition="in" filter="dissolve">
                                       <p:cBhvr>
-                                        <p:cTn id="32" dur="500"/>
+                                        <p:cTn id="26" dur="500"/>
                                         <p:tgtEl>
                                           <p:spTgt spid="86"/>
                                         </p:tgtEl>
@@ -5784,26 +5664,26 @@
                     </p:cTn>
                   </p:par>
                   <p:par>
-                    <p:cTn id="33" fill="hold">
+                    <p:cTn id="27" fill="hold">
                       <p:stCondLst>
                         <p:cond delay="indefinite"/>
                       </p:stCondLst>
                       <p:childTnLst>
                         <p:par>
-                          <p:cTn id="34" fill="hold">
+                          <p:cTn id="28" fill="hold">
                             <p:stCondLst>
                               <p:cond delay="0"/>
                             </p:stCondLst>
                             <p:childTnLst>
                               <p:par>
-                                <p:cTn id="35" presetID="9" presetClass="entr" presetSubtype="0" fill="hold" grpId="0" nodeType="clickEffect">
+                                <p:cTn id="29" presetID="9" presetClass="entr" presetSubtype="0" fill="hold" grpId="0" nodeType="clickEffect">
                                   <p:stCondLst>
                                     <p:cond delay="0"/>
                                   </p:stCondLst>
                                   <p:childTnLst>
                                     <p:set>
                                       <p:cBhvr>
-                                        <p:cTn id="36" dur="1" fill="hold">
+                                        <p:cTn id="30" dur="1" fill="hold">
                                           <p:stCondLst>
                                             <p:cond delay="0"/>
                                           </p:stCondLst>
@@ -5821,7 +5701,7 @@
                                     </p:set>
                                     <p:animEffect transition="in" filter="dissolve">
                                       <p:cBhvr>
-                                        <p:cTn id="37" dur="500"/>
+                                        <p:cTn id="31" dur="500"/>
                                         <p:tgtEl>
                                           <p:spTgt spid="85"/>
                                         </p:tgtEl>
@@ -5837,26 +5717,26 @@
                     </p:cTn>
                   </p:par>
                   <p:par>
-                    <p:cTn id="38" fill="hold">
+                    <p:cTn id="32" fill="hold">
                       <p:stCondLst>
                         <p:cond delay="indefinite"/>
                       </p:stCondLst>
                       <p:childTnLst>
                         <p:par>
-                          <p:cTn id="39" fill="hold">
+                          <p:cTn id="33" fill="hold">
                             <p:stCondLst>
                               <p:cond delay="0"/>
                             </p:stCondLst>
                             <p:childTnLst>
                               <p:par>
-                                <p:cTn id="40" presetID="9" presetClass="entr" presetSubtype="0" fill="hold" grpId="0" nodeType="clickEffect">
+                                <p:cTn id="34" presetID="9" presetClass="entr" presetSubtype="0" fill="hold" grpId="0" nodeType="clickEffect">
                                   <p:stCondLst>
                                     <p:cond delay="0"/>
                                   </p:stCondLst>
                                   <p:childTnLst>
                                     <p:set>
                                       <p:cBhvr>
-                                        <p:cTn id="41" dur="1" fill="hold">
+                                        <p:cTn id="35" dur="1" fill="hold">
                                           <p:stCondLst>
                                             <p:cond delay="0"/>
                                           </p:stCondLst>
@@ -5874,7 +5754,7 @@
                                     </p:set>
                                     <p:animEffect transition="in" filter="dissolve">
                                       <p:cBhvr>
-                                        <p:cTn id="42" dur="500"/>
+                                        <p:cTn id="36" dur="500"/>
                                         <p:tgtEl>
                                           <p:spTgt spid="659"/>
                                         </p:tgtEl>
@@ -5884,14 +5764,14 @@
                                 </p:cTn>
                               </p:par>
                               <p:par>
-                                <p:cTn id="43" presetID="9" presetClass="entr" presetSubtype="0" fill="hold" grpId="0" nodeType="withEffect">
+                                <p:cTn id="37" presetID="9" presetClass="entr" presetSubtype="0" fill="hold" grpId="0" nodeType="withEffect">
                                   <p:stCondLst>
                                     <p:cond delay="0"/>
                                   </p:stCondLst>
                                   <p:childTnLst>
                                     <p:set>
                                       <p:cBhvr>
-                                        <p:cTn id="44" dur="1" fill="hold">
+                                        <p:cTn id="38" dur="1" fill="hold">
                                           <p:stCondLst>
                                             <p:cond delay="0"/>
                                           </p:stCondLst>
@@ -5909,7 +5789,7 @@
                                     </p:set>
                                     <p:animEffect transition="in" filter="dissolve">
                                       <p:cBhvr>
-                                        <p:cTn id="45" dur="500"/>
+                                        <p:cTn id="39" dur="500"/>
                                         <p:tgtEl>
                                           <p:spTgt spid="655"/>
                                         </p:tgtEl>
@@ -5919,14 +5799,14 @@
                                 </p:cTn>
                               </p:par>
                               <p:par>
-                                <p:cTn id="46" presetID="9" presetClass="entr" presetSubtype="0" fill="hold" grpId="0" nodeType="withEffect">
+                                <p:cTn id="40" presetID="9" presetClass="entr" presetSubtype="0" fill="hold" grpId="0" nodeType="withEffect">
                                   <p:stCondLst>
                                     <p:cond delay="0"/>
                                   </p:stCondLst>
                                   <p:childTnLst>
                                     <p:set>
                                       <p:cBhvr>
-                                        <p:cTn id="47" dur="1" fill="hold">
+                                        <p:cTn id="41" dur="1" fill="hold">
                                           <p:stCondLst>
                                             <p:cond delay="0"/>
                                           </p:stCondLst>
@@ -5944,7 +5824,7 @@
                                     </p:set>
                                     <p:animEffect transition="in" filter="dissolve">
                                       <p:cBhvr>
-                                        <p:cTn id="48" dur="500"/>
+                                        <p:cTn id="42" dur="500"/>
                                         <p:tgtEl>
                                           <p:spTgt spid="81"/>
                                         </p:tgtEl>

</xml_diff>

<commit_message>
Update timepoint on schematic
</commit_message>
<xml_diff>
--- a/results/figures/5_days_PEG_exp_schematic.pptx
+++ b/results/figures/5_days_PEG_exp_schematic.pptx
@@ -197,7 +197,7 @@
           <a:p>
             <a:fld id="{77734EDB-3B6B-CA48-BB41-C96E8374FD30}" type="datetimeFigureOut">
               <a:rPr lang="en-US" smtClean="0"/>
-              <a:t>4/13/21</a:t>
+              <a:t>4/27/21</a:t>
             </a:fld>
             <a:endParaRPr lang="en-US"/>
           </a:p>
@@ -880,7 +880,7 @@
           <a:p>
             <a:fld id="{30AF97BF-8750-4713-9C5B-3A2A8059BBA3}" type="datetimeFigureOut">
               <a:rPr lang="en-US" smtClean="0"/>
-              <a:t>4/13/21</a:t>
+              <a:t>4/27/21</a:t>
             </a:fld>
             <a:endParaRPr lang="en-US"/>
           </a:p>
@@ -1050,7 +1050,7 @@
           <a:p>
             <a:fld id="{30AF97BF-8750-4713-9C5B-3A2A8059BBA3}" type="datetimeFigureOut">
               <a:rPr lang="en-US" smtClean="0"/>
-              <a:t>4/13/21</a:t>
+              <a:t>4/27/21</a:t>
             </a:fld>
             <a:endParaRPr lang="en-US"/>
           </a:p>
@@ -1230,7 +1230,7 @@
           <a:p>
             <a:fld id="{30AF97BF-8750-4713-9C5B-3A2A8059BBA3}" type="datetimeFigureOut">
               <a:rPr lang="en-US" smtClean="0"/>
-              <a:t>4/13/21</a:t>
+              <a:t>4/27/21</a:t>
             </a:fld>
             <a:endParaRPr lang="en-US"/>
           </a:p>
@@ -1400,7 +1400,7 @@
           <a:p>
             <a:fld id="{30AF97BF-8750-4713-9C5B-3A2A8059BBA3}" type="datetimeFigureOut">
               <a:rPr lang="en-US" smtClean="0"/>
-              <a:t>4/13/21</a:t>
+              <a:t>4/27/21</a:t>
             </a:fld>
             <a:endParaRPr lang="en-US"/>
           </a:p>
@@ -1646,7 +1646,7 @@
           <a:p>
             <a:fld id="{30AF97BF-8750-4713-9C5B-3A2A8059BBA3}" type="datetimeFigureOut">
               <a:rPr lang="en-US" smtClean="0"/>
-              <a:t>4/13/21</a:t>
+              <a:t>4/27/21</a:t>
             </a:fld>
             <a:endParaRPr lang="en-US"/>
           </a:p>
@@ -1878,7 +1878,7 @@
           <a:p>
             <a:fld id="{30AF97BF-8750-4713-9C5B-3A2A8059BBA3}" type="datetimeFigureOut">
               <a:rPr lang="en-US" smtClean="0"/>
-              <a:t>4/13/21</a:t>
+              <a:t>4/27/21</a:t>
             </a:fld>
             <a:endParaRPr lang="en-US"/>
           </a:p>
@@ -2245,7 +2245,7 @@
           <a:p>
             <a:fld id="{30AF97BF-8750-4713-9C5B-3A2A8059BBA3}" type="datetimeFigureOut">
               <a:rPr lang="en-US" smtClean="0"/>
-              <a:t>4/13/21</a:t>
+              <a:t>4/27/21</a:t>
             </a:fld>
             <a:endParaRPr lang="en-US"/>
           </a:p>
@@ -2363,7 +2363,7 @@
           <a:p>
             <a:fld id="{30AF97BF-8750-4713-9C5B-3A2A8059BBA3}" type="datetimeFigureOut">
               <a:rPr lang="en-US" smtClean="0"/>
-              <a:t>4/13/21</a:t>
+              <a:t>4/27/21</a:t>
             </a:fld>
             <a:endParaRPr lang="en-US"/>
           </a:p>
@@ -2458,7 +2458,7 @@
           <a:p>
             <a:fld id="{30AF97BF-8750-4713-9C5B-3A2A8059BBA3}" type="datetimeFigureOut">
               <a:rPr lang="en-US" smtClean="0"/>
-              <a:t>4/13/21</a:t>
+              <a:t>4/27/21</a:t>
             </a:fld>
             <a:endParaRPr lang="en-US"/>
           </a:p>
@@ -2735,7 +2735,7 @@
           <a:p>
             <a:fld id="{30AF97BF-8750-4713-9C5B-3A2A8059BBA3}" type="datetimeFigureOut">
               <a:rPr lang="en-US" smtClean="0"/>
-              <a:t>4/13/21</a:t>
+              <a:t>4/27/21</a:t>
             </a:fld>
             <a:endParaRPr lang="en-US"/>
           </a:p>
@@ -2992,7 +2992,7 @@
           <a:p>
             <a:fld id="{30AF97BF-8750-4713-9C5B-3A2A8059BBA3}" type="datetimeFigureOut">
               <a:rPr lang="en-US" smtClean="0"/>
-              <a:t>4/13/21</a:t>
+              <a:t>4/27/21</a:t>
             </a:fld>
             <a:endParaRPr lang="en-US"/>
           </a:p>
@@ -3205,7 +3205,7 @@
           <a:p>
             <a:fld id="{30AF97BF-8750-4713-9C5B-3A2A8059BBA3}" type="datetimeFigureOut">
               <a:rPr lang="en-US" smtClean="0"/>
-              <a:t>4/13/21</a:t>
+              <a:t>4/27/21</a:t>
             </a:fld>
             <a:endParaRPr lang="en-US"/>
           </a:p>
@@ -4580,7 +4580,7 @@
           <a:p>
             <a:pPr algn="ctr"/>
             <a:r>
-              <a:rPr lang="en" sz="2000" dirty="0">
+              <a:rPr lang="en" sz="2000">
                 <a:solidFill>
                   <a:schemeClr val="dk1"/>
                 </a:solidFill>
@@ -4588,8 +4588,16 @@
                 <a:cs typeface="Calibri"/>
                 <a:sym typeface="Calibri"/>
               </a:rPr>
-              <a:t>10</a:t>
-            </a:r>
+              <a:t>20</a:t>
+            </a:r>
+            <a:endParaRPr lang="en" sz="2000" dirty="0">
+              <a:solidFill>
+                <a:schemeClr val="dk1"/>
+              </a:solidFill>
+              <a:latin typeface="Calibri"/>
+              <a:cs typeface="Calibri"/>
+              <a:sym typeface="Calibri"/>
+            </a:endParaRPr>
           </a:p>
           <a:p>
             <a:pPr algn="ctr"/>

</xml_diff>